<commit_message>
Sim. 1 to 5 are done, remaining stabburn mining
Test is ok
</commit_message>
<xml_diff>
--- a/Selfish, Stubborn & GHOST Mining.pptx
+++ b/Selfish, Stubborn & GHOST Mining.pptx
@@ -11,6 +11,12 @@
     <p:sldId id="259" r:id="rId5"/>
     <p:sldId id="260" r:id="rId6"/>
     <p:sldId id="261" r:id="rId7"/>
+    <p:sldId id="262" r:id="rId8"/>
+    <p:sldId id="263" r:id="rId9"/>
+    <p:sldId id="264" r:id="rId10"/>
+    <p:sldId id="265" r:id="rId11"/>
+    <p:sldId id="266" r:id="rId12"/>
+    <p:sldId id="267" r:id="rId13"/>
   </p:sldIdLst>
   <p:sldSz cx="12192000" cy="6858000"/>
   <p:notesSz cx="6858000" cy="9144000"/>
@@ -109,6 +115,11 @@
       </a:defRPr>
     </a:lvl9pPr>
   </p:defaultTextStyle>
+  <p:extLst>
+    <p:ext uri="{EFAFB233-063F-42B5-8137-9DF3F51BA10A}">
+      <p15:sldGuideLst xmlns:p15="http://schemas.microsoft.com/office/powerpoint/2012/main"/>
+    </p:ext>
+  </p:extLst>
 </p:presentation>
 </file>
 
@@ -6186,7 +6197,7 @@
 </p:sld>
 </file>
 
-<file path=ppt/slides/slide2.xml><?xml version="1.0" encoding="utf-8"?>
+<file path=ppt/slides/slide10.xml><?xml version="1.0" encoding="utf-8"?>
 <p:sld xmlns:a="http://schemas.openxmlformats.org/drawingml/2006/main" xmlns:r="http://schemas.openxmlformats.org/officeDocument/2006/relationships" xmlns:p="http://schemas.openxmlformats.org/presentationml/2006/main">
   <p:cSld>
     <p:spTree>
@@ -6208,170 +6219,6 @@
           <p:cNvPr id="2" name="Tittel 1">
             <a:extLst>
               <a:ext uri="{FF2B5EF4-FFF2-40B4-BE49-F238E27FC236}">
-                <a16:creationId xmlns:a16="http://schemas.microsoft.com/office/drawing/2014/main" id="{E925D86E-D677-4681-AE6C-44E700DDB5E9}"/>
-              </a:ext>
-            </a:extLst>
-          </p:cNvPr>
-          <p:cNvSpPr>
-            <a:spLocks noGrp="1"/>
-          </p:cNvSpPr>
-          <p:nvPr>
-            <p:ph type="title"/>
-          </p:nvPr>
-        </p:nvSpPr>
-        <p:spPr/>
-        <p:txBody>
-          <a:bodyPr/>
-          <a:lstStyle/>
-          <a:p>
-            <a:r>
-              <a:rPr lang="nb-NO" dirty="0" err="1"/>
-              <a:t>Blockchain</a:t>
-            </a:r>
-            <a:r>
-              <a:rPr lang="nb-NO" dirty="0"/>
-              <a:t> Mining</a:t>
-            </a:r>
-          </a:p>
-        </p:txBody>
-      </p:sp>
-      <p:sp>
-        <p:nvSpPr>
-          <p:cNvPr id="3" name="Plassholder for innhold 2">
-            <a:extLst>
-              <a:ext uri="{FF2B5EF4-FFF2-40B4-BE49-F238E27FC236}">
-                <a16:creationId xmlns:a16="http://schemas.microsoft.com/office/drawing/2014/main" id="{EAD9C63B-9C8B-4B67-BE19-3D46E5522796}"/>
-              </a:ext>
-            </a:extLst>
-          </p:cNvPr>
-          <p:cNvSpPr>
-            <a:spLocks noGrp="1"/>
-          </p:cNvSpPr>
-          <p:nvPr>
-            <p:ph idx="1"/>
-          </p:nvPr>
-        </p:nvSpPr>
-        <p:spPr/>
-        <p:txBody>
-          <a:bodyPr>
-            <a:normAutofit/>
-          </a:bodyPr>
-          <a:lstStyle/>
-          <a:p>
-            <a:r>
-              <a:rPr lang="en-GB" dirty="0"/>
-              <a:t>3 main constraints: </a:t>
-            </a:r>
-          </a:p>
-          <a:p>
-            <a:pPr marL="0" indent="0">
-              <a:buNone/>
-            </a:pPr>
-            <a:r>
-              <a:rPr lang="en-GB" dirty="0"/>
-              <a:t>	- Mining Power.</a:t>
-            </a:r>
-          </a:p>
-          <a:p>
-            <a:pPr marL="0" indent="0">
-              <a:buNone/>
-            </a:pPr>
-            <a:r>
-              <a:rPr lang="en-GB" dirty="0"/>
-              <a:t>	- Network Power.</a:t>
-            </a:r>
-          </a:p>
-          <a:p>
-            <a:pPr marL="0" indent="0">
-              <a:buNone/>
-            </a:pPr>
-            <a:r>
-              <a:rPr lang="en-GB" dirty="0"/>
-              <a:t>	- Number of miners.</a:t>
-            </a:r>
-          </a:p>
-          <a:p>
-            <a:pPr marL="0" indent="0">
-              <a:buNone/>
-            </a:pPr>
-            <a:endParaRPr lang="en-GB" dirty="0"/>
-          </a:p>
-          <a:p>
-            <a:r>
-              <a:rPr lang="en-GB" dirty="0"/>
-              <a:t>Simulation environment </a:t>
-            </a:r>
-          </a:p>
-          <a:p>
-            <a:pPr marL="0" indent="0">
-              <a:buNone/>
-            </a:pPr>
-            <a:r>
-              <a:rPr lang="en-GB" dirty="0"/>
-              <a:t>	- 100 miners in total.</a:t>
-            </a:r>
-          </a:p>
-          <a:p>
-            <a:pPr marL="0" indent="0">
-              <a:buNone/>
-            </a:pPr>
-            <a:r>
-              <a:rPr lang="en-GB" dirty="0"/>
-              <a:t>	- Total mining power of 100</a:t>
-            </a:r>
-          </a:p>
-          <a:p>
-            <a:pPr marL="0" indent="0">
-              <a:buNone/>
-            </a:pPr>
-            <a:r>
-              <a:rPr lang="en-GB" dirty="0"/>
-              <a:t>	- Total network power of 100</a:t>
-            </a:r>
-          </a:p>
-          <a:p>
-            <a:pPr marL="0" indent="0">
-              <a:buNone/>
-            </a:pPr>
-            <a:endParaRPr lang="en-GB" dirty="0"/>
-          </a:p>
-        </p:txBody>
-      </p:sp>
-    </p:spTree>
-    <p:extLst>
-      <p:ext uri="{BB962C8B-B14F-4D97-AF65-F5344CB8AC3E}">
-        <p14:creationId xmlns:p14="http://schemas.microsoft.com/office/powerpoint/2010/main" val="3134738570"/>
-      </p:ext>
-    </p:extLst>
-  </p:cSld>
-  <p:clrMapOvr>
-    <a:masterClrMapping/>
-  </p:clrMapOvr>
-</p:sld>
-</file>
-
-<file path=ppt/slides/slide3.xml><?xml version="1.0" encoding="utf-8"?>
-<p:sld xmlns:a="http://schemas.openxmlformats.org/drawingml/2006/main" xmlns:r="http://schemas.openxmlformats.org/officeDocument/2006/relationships" xmlns:p="http://schemas.openxmlformats.org/presentationml/2006/main">
-  <p:cSld>
-    <p:spTree>
-      <p:nvGrpSpPr>
-        <p:cNvPr id="1" name=""/>
-        <p:cNvGrpSpPr/>
-        <p:nvPr/>
-      </p:nvGrpSpPr>
-      <p:grpSpPr>
-        <a:xfrm>
-          <a:off x="0" y="0"/>
-          <a:ext cx="0" cy="0"/>
-          <a:chOff x="0" y="0"/>
-          <a:chExt cx="0" cy="0"/>
-        </a:xfrm>
-      </p:grpSpPr>
-      <p:sp>
-        <p:nvSpPr>
-          <p:cNvPr id="2" name="Tittel 1">
-            <a:extLst>
-              <a:ext uri="{FF2B5EF4-FFF2-40B4-BE49-F238E27FC236}">
                 <a16:creationId xmlns:a16="http://schemas.microsoft.com/office/drawing/2014/main" id="{18C31D7D-A525-476E-B726-B49BDCDB2078}"/>
               </a:ext>
             </a:extLst>
@@ -6395,295 +6242,18 @@
           <a:p>
             <a:r>
               <a:rPr lang="en-GB" sz="1600" dirty="0"/>
-              <a:t>Analysis of mining power </a:t>
+              <a:t>Analysis of network power </a:t>
             </a:r>
             <a:br>
               <a:rPr lang="en-GB" dirty="0"/>
             </a:br>
             <a:r>
               <a:rPr lang="en-GB" dirty="0"/>
-              <a:t>Simulation nr. 1 - Setup</a:t>
-            </a:r>
-          </a:p>
-        </p:txBody>
-      </p:sp>
-      <p:sp>
-        <p:nvSpPr>
-          <p:cNvPr id="3" name="Plassholder for innhold 2">
-            <a:extLst>
-              <a:ext uri="{FF2B5EF4-FFF2-40B4-BE49-F238E27FC236}">
-                <a16:creationId xmlns:a16="http://schemas.microsoft.com/office/drawing/2014/main" id="{A3D68D6D-CD3E-4CB1-BBA5-1AA2A6400C9D}"/>
-              </a:ext>
-            </a:extLst>
-          </p:cNvPr>
-          <p:cNvSpPr>
-            <a:spLocks noGrp="1"/>
-          </p:cNvSpPr>
-          <p:nvPr>
-            <p:ph idx="1"/>
-          </p:nvPr>
-        </p:nvSpPr>
-        <p:spPr>
-          <a:xfrm>
-            <a:off x="1103312" y="1408922"/>
-            <a:ext cx="10028108" cy="4839478"/>
-          </a:xfrm>
-        </p:spPr>
-        <p:txBody>
-          <a:bodyPr>
-            <a:noAutofit/>
-          </a:bodyPr>
-          <a:lstStyle/>
-          <a:p>
-            <a:r>
-              <a:rPr lang="en-GB" sz="1600" dirty="0"/>
-              <a:t>S</a:t>
-            </a:r>
-            <a:r>
-              <a:rPr lang="en-US" sz="1600" dirty="0" err="1"/>
-              <a:t>tudying</a:t>
-            </a:r>
-            <a:r>
-              <a:rPr lang="en-US" sz="1600" dirty="0"/>
-              <a:t> the effect of an increasing mining power of just one selfish miner.</a:t>
-            </a:r>
-          </a:p>
-          <a:p>
-            <a:endParaRPr lang="en-US" sz="1600" dirty="0"/>
-          </a:p>
-          <a:p>
-            <a:r>
-              <a:rPr lang="en-US" sz="1600" dirty="0"/>
-              <a:t>Having:</a:t>
-            </a:r>
-          </a:p>
-          <a:p>
-            <a:pPr marL="0" indent="0">
-              <a:buNone/>
-            </a:pPr>
-            <a:r>
-              <a:rPr lang="en-US" sz="1600" dirty="0"/>
-              <a:t>	- 100 in total mining power and 100 miners.</a:t>
-            </a:r>
-          </a:p>
-          <a:p>
-            <a:pPr marL="0" indent="0">
-              <a:buNone/>
-            </a:pPr>
-            <a:r>
-              <a:rPr lang="en-US" sz="1600" dirty="0"/>
-              <a:t>	- 99 honest miners</a:t>
-            </a:r>
-          </a:p>
-          <a:p>
-            <a:pPr marL="0" indent="0">
-              <a:buNone/>
-            </a:pPr>
-            <a:r>
-              <a:rPr lang="en-US" sz="1600" dirty="0"/>
-              <a:t>	- 1 selfish miner</a:t>
-            </a:r>
-          </a:p>
-          <a:p>
-            <a:pPr marL="0" indent="0">
-              <a:buNone/>
-            </a:pPr>
-            <a:r>
-              <a:rPr lang="en-US" sz="1600" dirty="0"/>
-              <a:t>	- Network power is random in case of blockchain forks.</a:t>
-            </a:r>
-          </a:p>
-          <a:p>
-            <a:pPr marL="0" indent="0">
-              <a:buNone/>
-            </a:pPr>
-            <a:endParaRPr lang="en-US" sz="1600" dirty="0"/>
-          </a:p>
-          <a:p>
-            <a:r>
-              <a:rPr lang="en-US" sz="1600" dirty="0"/>
-              <a:t>We start the selfish mining power at 0% and the honest mining power at 100%.</a:t>
-            </a:r>
-          </a:p>
-          <a:p>
-            <a:endParaRPr lang="en-US" sz="1600" dirty="0"/>
-          </a:p>
-          <a:p>
-            <a:r>
-              <a:rPr lang="en-US" sz="1600" dirty="0"/>
-              <a:t>We run the simulation for 60 steps, and at each step:</a:t>
-            </a:r>
-          </a:p>
-          <a:p>
-            <a:pPr marL="0" indent="0">
-              <a:buNone/>
-            </a:pPr>
-            <a:r>
-              <a:rPr lang="en-US" sz="1600" dirty="0"/>
-              <a:t>	- Increasing the selfish mining power by 1.</a:t>
-            </a:r>
-          </a:p>
-          <a:p>
-            <a:pPr marL="0" indent="0">
-              <a:buNone/>
-            </a:pPr>
-            <a:r>
-              <a:rPr lang="en-US" sz="1600" dirty="0"/>
-              <a:t>	- Decreasing the honest mining power by 1. </a:t>
-            </a:r>
-          </a:p>
-          <a:p>
-            <a:pPr marL="0" indent="0">
-              <a:buNone/>
-            </a:pPr>
-            <a:endParaRPr lang="en-US" sz="1600" dirty="0"/>
-          </a:p>
-          <a:p>
-            <a:pPr marL="0" indent="0">
-              <a:buNone/>
-            </a:pPr>
-            <a:r>
-              <a:rPr lang="en-US" sz="1600" dirty="0"/>
-              <a:t> </a:t>
-            </a:r>
-            <a:endParaRPr lang="en-GB" sz="1600" dirty="0"/>
-          </a:p>
-        </p:txBody>
-      </p:sp>
-    </p:spTree>
-    <p:extLst>
-      <p:ext uri="{BB962C8B-B14F-4D97-AF65-F5344CB8AC3E}">
-        <p14:creationId xmlns:p14="http://schemas.microsoft.com/office/powerpoint/2010/main" val="140561625"/>
-      </p:ext>
-    </p:extLst>
-  </p:cSld>
-  <p:clrMapOvr>
-    <a:masterClrMapping/>
-  </p:clrMapOvr>
-</p:sld>
-</file>
-
-<file path=ppt/slides/slide4.xml><?xml version="1.0" encoding="utf-8"?>
-<p:sld xmlns:a="http://schemas.openxmlformats.org/drawingml/2006/main" xmlns:r="http://schemas.openxmlformats.org/officeDocument/2006/relationships" xmlns:p="http://schemas.openxmlformats.org/presentationml/2006/main">
-  <p:cSld>
-    <p:spTree>
-      <p:nvGrpSpPr>
-        <p:cNvPr id="1" name=""/>
-        <p:cNvGrpSpPr/>
-        <p:nvPr/>
-      </p:nvGrpSpPr>
-      <p:grpSpPr>
-        <a:xfrm>
-          <a:off x="0" y="0"/>
-          <a:ext cx="0" cy="0"/>
-          <a:chOff x="0" y="0"/>
-          <a:chExt cx="0" cy="0"/>
-        </a:xfrm>
-      </p:grpSpPr>
-      <p:sp>
-        <p:nvSpPr>
-          <p:cNvPr id="2" name="Tittel 1">
-            <a:extLst>
-              <a:ext uri="{FF2B5EF4-FFF2-40B4-BE49-F238E27FC236}">
-                <a16:creationId xmlns:a16="http://schemas.microsoft.com/office/drawing/2014/main" id="{18C31D7D-A525-476E-B726-B49BDCDB2078}"/>
-              </a:ext>
-            </a:extLst>
-          </p:cNvPr>
-          <p:cNvSpPr>
-            <a:spLocks noGrp="1"/>
-          </p:cNvSpPr>
-          <p:nvPr>
-            <p:ph type="title"/>
-          </p:nvPr>
-        </p:nvSpPr>
-        <p:spPr>
-          <a:xfrm>
-            <a:off x="646111" y="452718"/>
-            <a:ext cx="9404723" cy="909551"/>
-          </a:xfrm>
-        </p:spPr>
-        <p:txBody>
-          <a:bodyPr/>
-          <a:lstStyle/>
-          <a:p>
-            <a:r>
-              <a:rPr lang="en-GB" sz="1600" dirty="0"/>
-              <a:t>Analysis of mining power </a:t>
-            </a:r>
-            <a:br>
-              <a:rPr lang="en-GB" dirty="0"/>
-            </a:br>
-            <a:r>
-              <a:rPr lang="en-GB" dirty="0"/>
-              <a:t>Simulation nr. 1 – Results &amp; Analysis</a:t>
-            </a:r>
-          </a:p>
-        </p:txBody>
-      </p:sp>
-      <p:pic>
-        <p:nvPicPr>
-          <p:cNvPr id="9" name="Plassholder for innhold 8" descr="Et bilde som inneholder tekst&#10;&#10;Automatisk generert beskrivelse">
-            <a:extLst>
-              <a:ext uri="{FF2B5EF4-FFF2-40B4-BE49-F238E27FC236}">
-                <a16:creationId xmlns:a16="http://schemas.microsoft.com/office/drawing/2014/main" id="{5A065152-A84D-4877-8FEF-09DB9F268914}"/>
-              </a:ext>
-            </a:extLst>
-          </p:cNvPr>
-          <p:cNvPicPr>
-            <a:picLocks noGrp="1" noChangeAspect="1"/>
-          </p:cNvPicPr>
-          <p:nvPr>
-            <p:ph idx="1"/>
-          </p:nvPr>
-        </p:nvPicPr>
-        <p:blipFill>
-          <a:blip r:embed="rId2">
-            <a:extLst>
-              <a:ext uri="{28A0092B-C50C-407E-A947-70E740481C1C}">
-                <a14:useLocalDpi xmlns:a14="http://schemas.microsoft.com/office/drawing/2010/main" val="0"/>
-              </a:ext>
-            </a:extLst>
-          </a:blip>
-          <a:stretch>
-            <a:fillRect/>
-          </a:stretch>
-        </p:blipFill>
-        <p:spPr>
-          <a:xfrm>
-            <a:off x="574277" y="1640264"/>
-            <a:ext cx="5567286" cy="4863174"/>
-          </a:xfrm>
-          <a:prstGeom prst="roundRect">
-            <a:avLst>
-              <a:gd name="adj" fmla="val 4167"/>
-            </a:avLst>
-          </a:prstGeom>
-          <a:solidFill>
-            <a:srgbClr val="FFFFFF"/>
-          </a:solidFill>
-          <a:ln w="76200" cap="sq">
-            <a:solidFill>
-              <a:srgbClr val="EAEAEA"/>
-            </a:solidFill>
-            <a:miter lim="800000"/>
-          </a:ln>
-          <a:effectLst>
-            <a:reflection blurRad="12700" stA="33000" endPos="28000" dist="5000" dir="5400000" sy="-100000" algn="bl" rotWithShape="0"/>
-          </a:effectLst>
-          <a:scene3d>
-            <a:camera prst="orthographicFront"/>
-            <a:lightRig rig="threePt" dir="t">
-              <a:rot lat="0" lon="0" rev="2700000"/>
-            </a:lightRig>
-          </a:scene3d>
-          <a:sp3d contourW="6350">
-            <a:bevelT h="38100"/>
-            <a:contourClr>
-              <a:srgbClr val="C0C0C0"/>
-            </a:contourClr>
-          </a:sp3d>
-        </p:spPr>
-      </p:pic>
+              <a:t>Simulation nr. 4 – Results &amp; Analysis</a:t>
+            </a:r>
+          </a:p>
+        </p:txBody>
+      </p:sp>
       <p:sp>
         <p:nvSpPr>
           <p:cNvPr id="10" name="Plassholder for innhold 2">
@@ -6700,8 +6270,8 @@
         </p:nvSpPr>
         <p:spPr>
           <a:xfrm>
-            <a:off x="6372808" y="1640264"/>
-            <a:ext cx="4758612" cy="4765018"/>
+            <a:off x="6485640" y="1531856"/>
+            <a:ext cx="5434553" cy="4906266"/>
           </a:xfrm>
           <a:prstGeom prst="rect">
             <a:avLst/>
@@ -6941,7 +6511,7 @@
           <a:p>
             <a:r>
               <a:rPr lang="en-GB" sz="1600" dirty="0"/>
-              <a:t>&lt; 25% selfish mining power:</a:t>
+              <a:t>Under 80% network power for selfish miners.</a:t>
             </a:r>
           </a:p>
           <a:p>
@@ -6950,64 +6520,104 @@
             </a:pPr>
             <a:r>
               <a:rPr lang="en-GB" sz="1600" dirty="0"/>
+              <a:t>	- Less profitable selfish mining</a:t>
+            </a:r>
+          </a:p>
+          <a:p>
+            <a:pPr marL="0" indent="0">
+              <a:buNone/>
+            </a:pPr>
+            <a:r>
+              <a:rPr lang="en-GB" sz="1600" dirty="0"/>
+              <a:t>	</a:t>
+            </a:r>
+            <a:endParaRPr lang="en-US" sz="1600" dirty="0"/>
+          </a:p>
+          <a:p>
+            <a:r>
+              <a:rPr lang="en-US" sz="1600" dirty="0"/>
+              <a:t>At around 80% to 85%</a:t>
+            </a:r>
+            <a:endParaRPr lang="en-US" sz="1800" dirty="0"/>
+          </a:p>
+          <a:p>
+            <a:pPr marL="0" indent="0">
+              <a:buNone/>
+            </a:pPr>
+            <a:r>
+              <a:rPr lang="en-US" sz="1600" dirty="0"/>
+              <a:t>	- High competition between selfish and honest 	mining.</a:t>
+            </a:r>
+          </a:p>
+          <a:p>
+            <a:pPr marL="0" indent="0">
+              <a:buNone/>
+            </a:pPr>
+            <a:r>
+              <a:rPr lang="en-US" sz="1400" dirty="0"/>
+              <a:t>	</a:t>
+            </a:r>
+            <a:endParaRPr lang="en-US" sz="1600" dirty="0"/>
+          </a:p>
+          <a:p>
+            <a:r>
+              <a:rPr lang="en-US" sz="1400" dirty="0"/>
+              <a:t>Selfish mining is more profitable when</a:t>
+            </a:r>
+            <a:r>
+              <a:rPr lang="en-US" sz="1600" dirty="0"/>
+              <a:t>:</a:t>
+            </a:r>
+          </a:p>
+          <a:p>
+            <a:pPr marL="0" indent="0">
+              <a:buNone/>
+            </a:pPr>
+            <a:r>
+              <a:rPr lang="en-US" sz="1600" dirty="0"/>
               <a:t>	- </a:t>
             </a:r>
             <a:r>
+              <a:rPr lang="en-US" sz="1400" dirty="0"/>
+              <a:t>Selfish miners have more than 90% of network power 	together in total.</a:t>
+            </a:r>
+            <a:endParaRPr lang="en-US" sz="1600" dirty="0"/>
+          </a:p>
+          <a:p>
+            <a:pPr marL="0" indent="0">
+              <a:buNone/>
+            </a:pPr>
+            <a:r>
               <a:rPr lang="en-US" sz="1600" dirty="0"/>
-              <a:t>Total selfish profit is more likely to be less 		than total honest profit </a:t>
-            </a:r>
+              <a:t> </a:t>
+            </a:r>
+          </a:p>
+          <a:p>
+            <a:r>
+              <a:rPr lang="en-US" sz="1200" dirty="0"/>
+              <a:t>However, for an average miner it is most likely better to be an honest miner</a:t>
+            </a:r>
+            <a:endParaRPr lang="en-US" sz="1600" dirty="0"/>
           </a:p>
           <a:p>
             <a:pPr marL="0" indent="0">
               <a:buNone/>
             </a:pPr>
-            <a:endParaRPr lang="en-US" sz="1600" dirty="0"/>
-          </a:p>
-          <a:p>
             <a:r>
               <a:rPr lang="en-US" sz="1600" dirty="0"/>
-              <a:t>&gt;= 25% selfish mining power:</a:t>
-            </a:r>
-          </a:p>
-          <a:p>
-            <a:pPr marL="0" indent="0">
-              <a:buNone/>
-            </a:pPr>
-            <a:r>
-              <a:rPr lang="en-US" sz="1600" dirty="0"/>
-              <a:t>	- Profit of the selfish miner is highly 	competitive with the total honest profit 	generated by the other 99 honest miners.</a:t>
-            </a:r>
-          </a:p>
-          <a:p>
-            <a:endParaRPr lang="en-US" sz="1600" dirty="0"/>
-          </a:p>
-          <a:p>
-            <a:r>
-              <a:rPr lang="en-US" sz="1600" dirty="0"/>
-              <a:t>But does that mean selfish mining is a good strategy?</a:t>
-            </a:r>
-          </a:p>
-          <a:p>
-            <a:pPr marL="0" indent="0">
-              <a:buNone/>
-            </a:pPr>
-            <a:r>
-              <a:rPr lang="en-US" sz="1600" dirty="0"/>
-              <a:t>	- 1 selfish miner was able to claim from 0% 	to 40% of total profit for a mining power 	less than 25%.</a:t>
-            </a:r>
+              <a:t>	- </a:t>
+            </a:r>
+            <a:r>
+              <a:rPr lang="en-US" sz="1200" dirty="0"/>
+              <a:t>Since the average profit made by honest miners is most of the 	time higher than it is for those selfish miners.</a:t>
+            </a:r>
+            <a:endParaRPr lang="en-US" sz="1400" dirty="0"/>
           </a:p>
           <a:p>
             <a:pPr marL="0" indent="0">
               <a:buFont typeface="Wingdings 3" charset="2"/>
               <a:buNone/>
             </a:pPr>
-            <a:endParaRPr lang="en-US" sz="1600" dirty="0"/>
-          </a:p>
-          <a:p>
-            <a:pPr marL="0" indent="0">
-              <a:buFont typeface="Wingdings 3" charset="2"/>
-              <a:buNone/>
-            </a:pPr>
             <a:r>
               <a:rPr lang="en-US" sz="1600" dirty="0"/>
               <a:t> </a:t>
@@ -7016,10 +6626,40 @@
           </a:p>
         </p:txBody>
       </p:sp>
+      <p:pic>
+        <p:nvPicPr>
+          <p:cNvPr id="4" name="Bilde 3">
+            <a:extLst>
+              <a:ext uri="{FF2B5EF4-FFF2-40B4-BE49-F238E27FC236}">
+                <a16:creationId xmlns:a16="http://schemas.microsoft.com/office/drawing/2014/main" id="{924702D7-62F9-446B-ADD7-B9B2C47C9703}"/>
+              </a:ext>
+            </a:extLst>
+          </p:cNvPr>
+          <p:cNvPicPr>
+            <a:picLocks noChangeAspect="1"/>
+          </p:cNvPicPr>
+          <p:nvPr/>
+        </p:nvPicPr>
+        <p:blipFill>
+          <a:blip r:embed="rId2"/>
+          <a:stretch>
+            <a:fillRect/>
+          </a:stretch>
+        </p:blipFill>
+        <p:spPr>
+          <a:xfrm>
+            <a:off x="375149" y="1531856"/>
+            <a:ext cx="6136848" cy="5090474"/>
+          </a:xfrm>
+          <a:prstGeom prst="rect">
+            <a:avLst/>
+          </a:prstGeom>
+        </p:spPr>
+      </p:pic>
     </p:spTree>
     <p:extLst>
       <p:ext uri="{BB962C8B-B14F-4D97-AF65-F5344CB8AC3E}">
-        <p14:creationId xmlns:p14="http://schemas.microsoft.com/office/powerpoint/2010/main" val="162690125"/>
+        <p14:creationId xmlns:p14="http://schemas.microsoft.com/office/powerpoint/2010/main" val="3269546996"/>
       </p:ext>
     </p:extLst>
   </p:cSld>
@@ -7029,7 +6669,7 @@
 </p:sld>
 </file>
 
-<file path=ppt/slides/slide5.xml><?xml version="1.0" encoding="utf-8"?>
+<file path=ppt/slides/slide11.xml><?xml version="1.0" encoding="utf-8"?>
 <p:sld xmlns:a="http://schemas.openxmlformats.org/drawingml/2006/main" xmlns:r="http://schemas.openxmlformats.org/officeDocument/2006/relationships" xmlns:p="http://schemas.openxmlformats.org/presentationml/2006/main">
   <p:cSld>
     <p:spTree>
@@ -7074,14 +6714,14 @@
           <a:p>
             <a:r>
               <a:rPr lang="en-GB" sz="1600" dirty="0"/>
-              <a:t>Analysis of mining power </a:t>
+              <a:t>Analysis of Selfish Mining with the GHOST strategy</a:t>
             </a:r>
             <a:br>
               <a:rPr lang="en-GB" dirty="0"/>
             </a:br>
             <a:r>
               <a:rPr lang="en-GB" dirty="0"/>
-              <a:t>Simulation nr. 2 - Setup</a:t>
+              <a:t>Simulation nr. 5 - Setup</a:t>
             </a:r>
           </a:p>
         </p:txBody>
@@ -7104,8 +6744,8 @@
         </p:nvSpPr>
         <p:spPr>
           <a:xfrm>
-            <a:off x="1103312" y="1408922"/>
-            <a:ext cx="10028108" cy="5075854"/>
+            <a:off x="727788" y="1408922"/>
+            <a:ext cx="11318032" cy="5449078"/>
           </a:xfrm>
         </p:spPr>
         <p:txBody>
@@ -7116,7 +6756,7 @@
           <a:p>
             <a:r>
               <a:rPr lang="en-US" sz="1400" dirty="0"/>
-              <a:t>Studying the effect of an increasing number of selfish miners where all individual honest and selfish miners have equal mining power</a:t>
+              <a:t>Studying the effect of GHOST mining while increasing the selfish mining and network power by increasing the  number of selfish miners and decreasing the number of honest miners</a:t>
             </a:r>
             <a:r>
               <a:rPr lang="en-US" sz="1600" dirty="0"/>
@@ -7124,7 +6764,41 @@
             </a:r>
           </a:p>
           <a:p>
-            <a:endParaRPr lang="en-US" sz="1600" dirty="0"/>
+            <a:pPr lvl="1">
+              <a:buFontTx/>
+              <a:buChar char="-"/>
+            </a:pPr>
+            <a:r>
+              <a:rPr lang="nb-NO" sz="1400" b="1" dirty="0" err="1"/>
+              <a:t>Greedy</a:t>
+            </a:r>
+            <a:r>
+              <a:rPr lang="nb-NO" sz="1400" b="1" dirty="0"/>
+              <a:t> </a:t>
+            </a:r>
+            <a:r>
+              <a:rPr lang="nb-NO" sz="1400" b="1" dirty="0" err="1"/>
+              <a:t>Heaviest-Observed</a:t>
+            </a:r>
+            <a:r>
+              <a:rPr lang="nb-NO" sz="1400" b="1" dirty="0"/>
+              <a:t> </a:t>
+            </a:r>
+            <a:r>
+              <a:rPr lang="nb-NO" sz="1400" b="1" dirty="0" err="1"/>
+              <a:t>Subtree</a:t>
+            </a:r>
+            <a:r>
+              <a:rPr lang="nb-NO" sz="1400" b="1" dirty="0"/>
+              <a:t>, GHOST</a:t>
+            </a:r>
+          </a:p>
+          <a:p>
+            <a:pPr lvl="1">
+              <a:buFontTx/>
+              <a:buChar char="-"/>
+            </a:pPr>
+            <a:endParaRPr lang="en-US" sz="1400" dirty="0"/>
           </a:p>
           <a:p>
             <a:r>
@@ -7138,7 +6812,7 @@
             </a:pPr>
             <a:r>
               <a:rPr lang="en-US" sz="1600" dirty="0"/>
-              <a:t>	- 100 in total mining power and 100 miners.</a:t>
+              <a:t>	- 100 in total network power, 100 in total mining power, and 100 miners.</a:t>
             </a:r>
           </a:p>
           <a:p>
@@ -7147,7 +6821,7 @@
             </a:pPr>
             <a:r>
               <a:rPr lang="en-US" sz="1600" dirty="0"/>
-              <a:t>	- Every miner always has an equal power of 1.</a:t>
+              <a:t>	- Every miner always has an equal network and mining power of 1.</a:t>
             </a:r>
           </a:p>
           <a:p>
@@ -7156,19 +6830,22 @@
             </a:pPr>
             <a:r>
               <a:rPr lang="en-US" sz="1600" dirty="0"/>
-              <a:t>	- Network power is random in case of blockchain forks.</a:t>
+              <a:t>	- Network power is weighted random.</a:t>
             </a:r>
           </a:p>
           <a:p>
             <a:pPr marL="0" indent="0">
               <a:buNone/>
             </a:pPr>
-            <a:endParaRPr lang="en-US" sz="1600" dirty="0"/>
-          </a:p>
-          <a:p>
             <a:r>
               <a:rPr lang="en-US" sz="1600" dirty="0"/>
-              <a:t>We start the selfish mining power at 0% (0 selfish miners) </a:t>
+              <a:t>	- Mining and network power is equal for all miners to isolate its effect on mining and observe the effect of GHOST mining alone.</a:t>
+            </a:r>
+          </a:p>
+          <a:p>
+            <a:r>
+              <a:rPr lang="en-US" sz="1600" dirty="0"/>
+              <a:t>We start the selfish network and mining power at 0% (0 selfish miners) </a:t>
             </a:r>
           </a:p>
           <a:p>
@@ -7177,16 +6854,13 @@
             </a:pPr>
             <a:r>
               <a:rPr lang="en-US" sz="1600" dirty="0"/>
-              <a:t>	And the honest mining power at 100% (100 honest miners). </a:t>
-            </a:r>
-          </a:p>
-          <a:p>
-            <a:endParaRPr lang="en-US" sz="1600" dirty="0"/>
+              <a:t>	And the honest network and mining power at 100% (100 honest miners). </a:t>
+            </a:r>
           </a:p>
           <a:p>
             <a:r>
               <a:rPr lang="en-US" sz="1600" dirty="0"/>
-              <a:t>We run the simulation for 60 steps, and at each step:</a:t>
+              <a:t>We run the simulation for 100 steps, and at each step:</a:t>
             </a:r>
           </a:p>
           <a:p>
@@ -7195,7 +6869,7 @@
             </a:pPr>
             <a:r>
               <a:rPr lang="en-US" sz="1600" dirty="0"/>
-              <a:t>	- Increasing the selfish mining power by increasing the number of selfish miners by 1.</a:t>
+              <a:t>	- Increasing the selfish network and mining power by increasing the number of selfish miners by 1.</a:t>
             </a:r>
           </a:p>
           <a:p>
@@ -7204,7 +6878,7 @@
             </a:pPr>
             <a:r>
               <a:rPr lang="en-US" sz="1600" dirty="0"/>
-              <a:t>	- Decreasing the honest mining power by decreasing the number of honest miners by 1.</a:t>
+              <a:t>	- Decreasing the honest network and mining power by decreasing the number of honest miners by 1.</a:t>
             </a:r>
           </a:p>
           <a:p>
@@ -7228,7 +6902,7 @@
     </p:spTree>
     <p:extLst>
       <p:ext uri="{BB962C8B-B14F-4D97-AF65-F5344CB8AC3E}">
-        <p14:creationId xmlns:p14="http://schemas.microsoft.com/office/powerpoint/2010/main" val="3325810243"/>
+        <p14:creationId xmlns:p14="http://schemas.microsoft.com/office/powerpoint/2010/main" val="1768961838"/>
       </p:ext>
     </p:extLst>
   </p:cSld>
@@ -7238,7 +6912,7 @@
 </p:sld>
 </file>
 
-<file path=ppt/slides/slide6.xml><?xml version="1.0" encoding="utf-8"?>
+<file path=ppt/slides/slide12.xml><?xml version="1.0" encoding="utf-8"?>
 <p:sld xmlns:a="http://schemas.openxmlformats.org/drawingml/2006/main" xmlns:r="http://schemas.openxmlformats.org/officeDocument/2006/relationships" xmlns:p="http://schemas.openxmlformats.org/presentationml/2006/main">
   <p:cSld>
     <p:spTree>
@@ -7283,14 +6957,14 @@
           <a:p>
             <a:r>
               <a:rPr lang="en-GB" sz="1600" dirty="0"/>
-              <a:t>Analysis of mining power </a:t>
+              <a:t>Analysis of Selfish Mining with the GHOST strategy</a:t>
             </a:r>
             <a:br>
               <a:rPr lang="en-GB" dirty="0"/>
             </a:br>
             <a:r>
               <a:rPr lang="en-GB" dirty="0"/>
-              <a:t>Simulation nr. 2 – Results &amp; Analysis</a:t>
+              <a:t>Simulation nr. 5 – Results &amp; Analysis</a:t>
             </a:r>
           </a:p>
         </p:txBody>
@@ -7311,8 +6985,8 @@
         </p:nvSpPr>
         <p:spPr>
           <a:xfrm>
-            <a:off x="6372808" y="1640263"/>
-            <a:ext cx="5547386" cy="4892511"/>
+            <a:off x="6485640" y="2286000"/>
+            <a:ext cx="5434553" cy="2346649"/>
           </a:xfrm>
           <a:prstGeom prst="rect">
             <a:avLst/>
@@ -7551,8 +7225,345 @@
           </a:lstStyle>
           <a:p>
             <a:r>
+              <a:rPr lang="en-US" sz="1600" dirty="0"/>
+              <a:t>Selfish miners following the GHOST strategy have to get hold on more than 80% of both network and mining power to be start making more profit then honest miners. </a:t>
+            </a:r>
+          </a:p>
+          <a:p>
+            <a:pPr marL="0" indent="0">
+              <a:buNone/>
+            </a:pPr>
+            <a:r>
+              <a:rPr lang="en-US" sz="1400" dirty="0"/>
+              <a:t>	</a:t>
+            </a:r>
+            <a:endParaRPr lang="en-US" sz="1600" dirty="0"/>
+          </a:p>
+          <a:p>
+            <a:r>
+              <a:rPr lang="en-US" sz="1400" dirty="0"/>
+              <a:t>On average, single honest miners makes more profit than their counter GHOST selfish miners, as shown in the right plot on the right side.</a:t>
+            </a:r>
+            <a:r>
+              <a:rPr lang="en-US" sz="1600" dirty="0"/>
+              <a:t> </a:t>
+            </a:r>
+            <a:endParaRPr lang="en-GB" sz="1600" dirty="0"/>
+          </a:p>
+        </p:txBody>
+      </p:sp>
+      <p:pic>
+        <p:nvPicPr>
+          <p:cNvPr id="5" name="Bilde 4">
+            <a:extLst>
+              <a:ext uri="{FF2B5EF4-FFF2-40B4-BE49-F238E27FC236}">
+                <a16:creationId xmlns:a16="http://schemas.microsoft.com/office/drawing/2014/main" id="{1910C620-5B56-4421-BBEB-4553EB46101C}"/>
+              </a:ext>
+            </a:extLst>
+          </p:cNvPr>
+          <p:cNvPicPr>
+            <a:picLocks noChangeAspect="1"/>
+          </p:cNvPicPr>
+          <p:nvPr/>
+        </p:nvPicPr>
+        <p:blipFill>
+          <a:blip r:embed="rId2"/>
+          <a:stretch>
+            <a:fillRect/>
+          </a:stretch>
+        </p:blipFill>
+        <p:spPr>
+          <a:xfrm>
+            <a:off x="207390" y="1531856"/>
+            <a:ext cx="6174556" cy="5085760"/>
+          </a:xfrm>
+          <a:prstGeom prst="rect">
+            <a:avLst/>
+          </a:prstGeom>
+        </p:spPr>
+      </p:pic>
+    </p:spTree>
+    <p:extLst>
+      <p:ext uri="{BB962C8B-B14F-4D97-AF65-F5344CB8AC3E}">
+        <p14:creationId xmlns:p14="http://schemas.microsoft.com/office/powerpoint/2010/main" val="3688249173"/>
+      </p:ext>
+    </p:extLst>
+  </p:cSld>
+  <p:clrMapOvr>
+    <a:masterClrMapping/>
+  </p:clrMapOvr>
+</p:sld>
+</file>
+
+<file path=ppt/slides/slide2.xml><?xml version="1.0" encoding="utf-8"?>
+<p:sld xmlns:a="http://schemas.openxmlformats.org/drawingml/2006/main" xmlns:r="http://schemas.openxmlformats.org/officeDocument/2006/relationships" xmlns:p="http://schemas.openxmlformats.org/presentationml/2006/main">
+  <p:cSld>
+    <p:spTree>
+      <p:nvGrpSpPr>
+        <p:cNvPr id="1" name=""/>
+        <p:cNvGrpSpPr/>
+        <p:nvPr/>
+      </p:nvGrpSpPr>
+      <p:grpSpPr>
+        <a:xfrm>
+          <a:off x="0" y="0"/>
+          <a:ext cx="0" cy="0"/>
+          <a:chOff x="0" y="0"/>
+          <a:chExt cx="0" cy="0"/>
+        </a:xfrm>
+      </p:grpSpPr>
+      <p:sp>
+        <p:nvSpPr>
+          <p:cNvPr id="2" name="Tittel 1">
+            <a:extLst>
+              <a:ext uri="{FF2B5EF4-FFF2-40B4-BE49-F238E27FC236}">
+                <a16:creationId xmlns:a16="http://schemas.microsoft.com/office/drawing/2014/main" id="{E925D86E-D677-4681-AE6C-44E700DDB5E9}"/>
+              </a:ext>
+            </a:extLst>
+          </p:cNvPr>
+          <p:cNvSpPr>
+            <a:spLocks noGrp="1"/>
+          </p:cNvSpPr>
+          <p:nvPr>
+            <p:ph type="title"/>
+          </p:nvPr>
+        </p:nvSpPr>
+        <p:spPr/>
+        <p:txBody>
+          <a:bodyPr/>
+          <a:lstStyle/>
+          <a:p>
+            <a:r>
+              <a:rPr lang="nb-NO" dirty="0" err="1"/>
+              <a:t>Blockchain</a:t>
+            </a:r>
+            <a:r>
+              <a:rPr lang="nb-NO" dirty="0"/>
+              <a:t> Mining</a:t>
+            </a:r>
+          </a:p>
+        </p:txBody>
+      </p:sp>
+      <p:sp>
+        <p:nvSpPr>
+          <p:cNvPr id="3" name="Plassholder for innhold 2">
+            <a:extLst>
+              <a:ext uri="{FF2B5EF4-FFF2-40B4-BE49-F238E27FC236}">
+                <a16:creationId xmlns:a16="http://schemas.microsoft.com/office/drawing/2014/main" id="{EAD9C63B-9C8B-4B67-BE19-3D46E5522796}"/>
+              </a:ext>
+            </a:extLst>
+          </p:cNvPr>
+          <p:cNvSpPr>
+            <a:spLocks noGrp="1"/>
+          </p:cNvSpPr>
+          <p:nvPr>
+            <p:ph idx="1"/>
+          </p:nvPr>
+        </p:nvSpPr>
+        <p:spPr/>
+        <p:txBody>
+          <a:bodyPr>
+            <a:normAutofit/>
+          </a:bodyPr>
+          <a:lstStyle/>
+          <a:p>
+            <a:r>
+              <a:rPr lang="en-GB" dirty="0"/>
+              <a:t>3 main constraints: </a:t>
+            </a:r>
+          </a:p>
+          <a:p>
+            <a:pPr marL="0" indent="0">
+              <a:buNone/>
+            </a:pPr>
+            <a:r>
+              <a:rPr lang="en-GB" dirty="0"/>
+              <a:t>	- Mining Power.</a:t>
+            </a:r>
+          </a:p>
+          <a:p>
+            <a:pPr marL="0" indent="0">
+              <a:buNone/>
+            </a:pPr>
+            <a:r>
+              <a:rPr lang="en-GB" dirty="0"/>
+              <a:t>	- Network Power.</a:t>
+            </a:r>
+          </a:p>
+          <a:p>
+            <a:pPr marL="0" indent="0">
+              <a:buNone/>
+            </a:pPr>
+            <a:r>
+              <a:rPr lang="en-GB" dirty="0"/>
+              <a:t>	- Number of miners.</a:t>
+            </a:r>
+          </a:p>
+          <a:p>
+            <a:pPr marL="0" indent="0">
+              <a:buNone/>
+            </a:pPr>
+            <a:endParaRPr lang="en-GB" dirty="0"/>
+          </a:p>
+          <a:p>
+            <a:r>
+              <a:rPr lang="en-GB" dirty="0"/>
+              <a:t>Simulation environment </a:t>
+            </a:r>
+          </a:p>
+          <a:p>
+            <a:pPr marL="0" indent="0">
+              <a:buNone/>
+            </a:pPr>
+            <a:r>
+              <a:rPr lang="en-GB" dirty="0"/>
+              <a:t>	- 100 miners in total.</a:t>
+            </a:r>
+          </a:p>
+          <a:p>
+            <a:pPr marL="0" indent="0">
+              <a:buNone/>
+            </a:pPr>
+            <a:r>
+              <a:rPr lang="en-GB" dirty="0"/>
+              <a:t>	- Total mining power of 100</a:t>
+            </a:r>
+          </a:p>
+          <a:p>
+            <a:pPr marL="0" indent="0">
+              <a:buNone/>
+            </a:pPr>
+            <a:r>
+              <a:rPr lang="en-GB" dirty="0"/>
+              <a:t>	- Total network power of 100</a:t>
+            </a:r>
+          </a:p>
+          <a:p>
+            <a:pPr marL="0" indent="0">
+              <a:buNone/>
+            </a:pPr>
+            <a:endParaRPr lang="en-GB" dirty="0"/>
+          </a:p>
+        </p:txBody>
+      </p:sp>
+    </p:spTree>
+    <p:extLst>
+      <p:ext uri="{BB962C8B-B14F-4D97-AF65-F5344CB8AC3E}">
+        <p14:creationId xmlns:p14="http://schemas.microsoft.com/office/powerpoint/2010/main" val="3134738570"/>
+      </p:ext>
+    </p:extLst>
+  </p:cSld>
+  <p:clrMapOvr>
+    <a:masterClrMapping/>
+  </p:clrMapOvr>
+</p:sld>
+</file>
+
+<file path=ppt/slides/slide3.xml><?xml version="1.0" encoding="utf-8"?>
+<p:sld xmlns:a="http://schemas.openxmlformats.org/drawingml/2006/main" xmlns:r="http://schemas.openxmlformats.org/officeDocument/2006/relationships" xmlns:p="http://schemas.openxmlformats.org/presentationml/2006/main">
+  <p:cSld>
+    <p:spTree>
+      <p:nvGrpSpPr>
+        <p:cNvPr id="1" name=""/>
+        <p:cNvGrpSpPr/>
+        <p:nvPr/>
+      </p:nvGrpSpPr>
+      <p:grpSpPr>
+        <a:xfrm>
+          <a:off x="0" y="0"/>
+          <a:ext cx="0" cy="0"/>
+          <a:chOff x="0" y="0"/>
+          <a:chExt cx="0" cy="0"/>
+        </a:xfrm>
+      </p:grpSpPr>
+      <p:sp>
+        <p:nvSpPr>
+          <p:cNvPr id="2" name="Tittel 1">
+            <a:extLst>
+              <a:ext uri="{FF2B5EF4-FFF2-40B4-BE49-F238E27FC236}">
+                <a16:creationId xmlns:a16="http://schemas.microsoft.com/office/drawing/2014/main" id="{18C31D7D-A525-476E-B726-B49BDCDB2078}"/>
+              </a:ext>
+            </a:extLst>
+          </p:cNvPr>
+          <p:cNvSpPr>
+            <a:spLocks noGrp="1"/>
+          </p:cNvSpPr>
+          <p:nvPr>
+            <p:ph type="title"/>
+          </p:nvPr>
+        </p:nvSpPr>
+        <p:spPr>
+          <a:xfrm>
+            <a:off x="646111" y="452718"/>
+            <a:ext cx="9404723" cy="909551"/>
+          </a:xfrm>
+        </p:spPr>
+        <p:txBody>
+          <a:bodyPr/>
+          <a:lstStyle/>
+          <a:p>
+            <a:r>
               <a:rPr lang="en-GB" sz="1600" dirty="0"/>
-              <a:t>From 0% (0 selfish miners) to 60% (60 selfish miners) selfish mining power</a:t>
+              <a:t>Analysis of mining power </a:t>
+            </a:r>
+            <a:br>
+              <a:rPr lang="en-GB" dirty="0"/>
+            </a:br>
+            <a:r>
+              <a:rPr lang="en-GB" dirty="0"/>
+              <a:t>Simulation nr. 1 - Setup</a:t>
+            </a:r>
+          </a:p>
+        </p:txBody>
+      </p:sp>
+      <p:sp>
+        <p:nvSpPr>
+          <p:cNvPr id="3" name="Plassholder for innhold 2">
+            <a:extLst>
+              <a:ext uri="{FF2B5EF4-FFF2-40B4-BE49-F238E27FC236}">
+                <a16:creationId xmlns:a16="http://schemas.microsoft.com/office/drawing/2014/main" id="{A3D68D6D-CD3E-4CB1-BBA5-1AA2A6400C9D}"/>
+              </a:ext>
+            </a:extLst>
+          </p:cNvPr>
+          <p:cNvSpPr>
+            <a:spLocks noGrp="1"/>
+          </p:cNvSpPr>
+          <p:nvPr>
+            <p:ph idx="1"/>
+          </p:nvPr>
+        </p:nvSpPr>
+        <p:spPr>
+          <a:xfrm>
+            <a:off x="1103312" y="1408922"/>
+            <a:ext cx="10028108" cy="4839478"/>
+          </a:xfrm>
+        </p:spPr>
+        <p:txBody>
+          <a:bodyPr>
+            <a:noAutofit/>
+          </a:bodyPr>
+          <a:lstStyle/>
+          <a:p>
+            <a:r>
+              <a:rPr lang="en-GB" sz="1600" dirty="0"/>
+              <a:t>S</a:t>
+            </a:r>
+            <a:r>
+              <a:rPr lang="en-US" sz="1600" dirty="0" err="1"/>
+              <a:t>tudying</a:t>
+            </a:r>
+            <a:r>
+              <a:rPr lang="en-US" sz="1600" dirty="0"/>
+              <a:t> the effect of an increasing mining power of just one selfish miner.</a:t>
+            </a:r>
+          </a:p>
+          <a:p>
+            <a:endParaRPr lang="en-US" sz="1600" dirty="0"/>
+          </a:p>
+          <a:p>
+            <a:r>
+              <a:rPr lang="en-US" sz="1600" dirty="0"/>
+              <a:t>Having:</a:t>
             </a:r>
           </a:p>
           <a:p>
@@ -7560,8 +7571,35 @@
               <a:buNone/>
             </a:pPr>
             <a:r>
-              <a:rPr lang="en-GB" sz="1600" dirty="0"/>
-              <a:t>	- Increasing selfish profit</a:t>
+              <a:rPr lang="en-US" sz="1600" dirty="0"/>
+              <a:t>	- 100 in total mining power and 100 miners.</a:t>
+            </a:r>
+          </a:p>
+          <a:p>
+            <a:pPr marL="0" indent="0">
+              <a:buNone/>
+            </a:pPr>
+            <a:r>
+              <a:rPr lang="en-US" sz="1600" dirty="0"/>
+              <a:t>	- 99 honest miners</a:t>
+            </a:r>
+          </a:p>
+          <a:p>
+            <a:pPr marL="0" indent="0">
+              <a:buNone/>
+            </a:pPr>
+            <a:r>
+              <a:rPr lang="en-US" sz="1600" dirty="0"/>
+              <a:t>	- 1 selfish miner</a:t>
+            </a:r>
+          </a:p>
+          <a:p>
+            <a:pPr marL="0" indent="0">
+              <a:buNone/>
+            </a:pPr>
+            <a:r>
+              <a:rPr lang="en-US" sz="1600" dirty="0"/>
+              <a:t>	- Network power is random in case of blockchain forks.</a:t>
             </a:r>
           </a:p>
           <a:p>
@@ -7573,7 +7611,16 @@
           <a:p>
             <a:r>
               <a:rPr lang="en-US" sz="1600" dirty="0"/>
-              <a:t>From 100% (100 honest miners) to 40% (40 honest miners) honest mining power</a:t>
+              <a:t>We start the selfish mining power at 0% and the honest mining power at 100%.</a:t>
+            </a:r>
+          </a:p>
+          <a:p>
+            <a:endParaRPr lang="en-US" sz="1600" dirty="0"/>
+          </a:p>
+          <a:p>
+            <a:r>
+              <a:rPr lang="en-US" sz="1600" dirty="0"/>
+              <a:t>We run the simulation for 60 steps, and at each step:</a:t>
             </a:r>
           </a:p>
           <a:p>
@@ -7582,7 +7629,16 @@
             </a:pPr>
             <a:r>
               <a:rPr lang="en-US" sz="1600" dirty="0"/>
-              <a:t>	- Decreasing honest profit	</a:t>
+              <a:t>	- Increasing the selfish mining power by 1.</a:t>
+            </a:r>
+          </a:p>
+          <a:p>
+            <a:pPr marL="0" indent="0">
+              <a:buNone/>
+            </a:pPr>
+            <a:r>
+              <a:rPr lang="en-US" sz="1600" dirty="0"/>
+              <a:t>	- Decreasing the honest mining power by 1. </a:t>
             </a:r>
           </a:p>
           <a:p>
@@ -7592,21 +7648,6 @@
             <a:endParaRPr lang="en-US" sz="1600" dirty="0"/>
           </a:p>
           <a:p>
-            <a:r>
-              <a:rPr lang="en-US" sz="1600" dirty="0"/>
-              <a:t>Stable average profit of an honest miner at 0.01%.</a:t>
-            </a:r>
-          </a:p>
-          <a:p>
-            <a:pPr marL="0" indent="0">
-              <a:buNone/>
-            </a:pPr>
-            <a:r>
-              <a:rPr lang="en-US" sz="1600" dirty="0"/>
-              <a:t>	- Good/Fair distribution of profit among miners.</a:t>
-            </a:r>
-          </a:p>
-          <a:p>
             <a:pPr marL="0" indent="0">
               <a:buNone/>
             </a:pPr>
@@ -7614,21 +7655,398 @@
               <a:rPr lang="en-US" sz="1600" dirty="0"/>
               <a:t> </a:t>
             </a:r>
-          </a:p>
-          <a:p>
+            <a:endParaRPr lang="en-GB" sz="1600" dirty="0"/>
+          </a:p>
+        </p:txBody>
+      </p:sp>
+    </p:spTree>
+    <p:extLst>
+      <p:ext uri="{BB962C8B-B14F-4D97-AF65-F5344CB8AC3E}">
+        <p14:creationId xmlns:p14="http://schemas.microsoft.com/office/powerpoint/2010/main" val="140561625"/>
+      </p:ext>
+    </p:extLst>
+  </p:cSld>
+  <p:clrMapOvr>
+    <a:masterClrMapping/>
+  </p:clrMapOvr>
+</p:sld>
+</file>
+
+<file path=ppt/slides/slide4.xml><?xml version="1.0" encoding="utf-8"?>
+<p:sld xmlns:a="http://schemas.openxmlformats.org/drawingml/2006/main" xmlns:r="http://schemas.openxmlformats.org/officeDocument/2006/relationships" xmlns:p="http://schemas.openxmlformats.org/presentationml/2006/main">
+  <p:cSld>
+    <p:spTree>
+      <p:nvGrpSpPr>
+        <p:cNvPr id="1" name=""/>
+        <p:cNvGrpSpPr/>
+        <p:nvPr/>
+      </p:nvGrpSpPr>
+      <p:grpSpPr>
+        <a:xfrm>
+          <a:off x="0" y="0"/>
+          <a:ext cx="0" cy="0"/>
+          <a:chOff x="0" y="0"/>
+          <a:chExt cx="0" cy="0"/>
+        </a:xfrm>
+      </p:grpSpPr>
+      <p:sp>
+        <p:nvSpPr>
+          <p:cNvPr id="2" name="Tittel 1">
+            <a:extLst>
+              <a:ext uri="{FF2B5EF4-FFF2-40B4-BE49-F238E27FC236}">
+                <a16:creationId xmlns:a16="http://schemas.microsoft.com/office/drawing/2014/main" id="{18C31D7D-A525-476E-B726-B49BDCDB2078}"/>
+              </a:ext>
+            </a:extLst>
+          </p:cNvPr>
+          <p:cNvSpPr>
+            <a:spLocks noGrp="1"/>
+          </p:cNvSpPr>
+          <p:nvPr>
+            <p:ph type="title"/>
+          </p:nvPr>
+        </p:nvSpPr>
+        <p:spPr>
+          <a:xfrm>
+            <a:off x="646111" y="452718"/>
+            <a:ext cx="9404723" cy="909551"/>
+          </a:xfrm>
+        </p:spPr>
+        <p:txBody>
+          <a:bodyPr/>
+          <a:lstStyle/>
+          <a:p>
+            <a:r>
+              <a:rPr lang="en-GB" sz="1600" dirty="0"/>
+              <a:t>Analysis of mining power </a:t>
+            </a:r>
+            <a:br>
+              <a:rPr lang="en-GB" dirty="0"/>
+            </a:br>
+            <a:r>
+              <a:rPr lang="en-GB" dirty="0"/>
+              <a:t>Simulation nr. 1 – Results &amp; Analysis</a:t>
+            </a:r>
+          </a:p>
+        </p:txBody>
+      </p:sp>
+      <p:sp>
+        <p:nvSpPr>
+          <p:cNvPr id="10" name="Plassholder for innhold 2">
+            <a:extLst>
+              <a:ext uri="{FF2B5EF4-FFF2-40B4-BE49-F238E27FC236}">
+                <a16:creationId xmlns:a16="http://schemas.microsoft.com/office/drawing/2014/main" id="{7F861BE9-0CDC-441E-B0B8-80D81F938C07}"/>
+              </a:ext>
+            </a:extLst>
+          </p:cNvPr>
+          <p:cNvSpPr txBox="1">
+            <a:spLocks/>
+          </p:cNvSpPr>
+          <p:nvPr/>
+        </p:nvSpPr>
+        <p:spPr>
+          <a:xfrm>
+            <a:off x="6372808" y="1640264"/>
+            <a:ext cx="4758612" cy="4765018"/>
+          </a:xfrm>
+          <a:prstGeom prst="rect">
+            <a:avLst/>
+          </a:prstGeom>
+        </p:spPr>
+        <p:txBody>
+          <a:bodyPr vert="horz" lIns="91440" tIns="45720" rIns="91440" bIns="45720" rtlCol="0">
+            <a:noAutofit/>
+          </a:bodyPr>
+          <a:lstStyle>
+            <a:lvl1pPr marL="342900" indent="-342900" algn="l" defTabSz="457200" rtl="0" eaLnBrk="1" latinLnBrk="0" hangingPunct="1">
+              <a:spcBef>
+                <a:spcPts val="1000"/>
+              </a:spcBef>
+              <a:spcAft>
+                <a:spcPts val="0"/>
+              </a:spcAft>
+              <a:buClr>
+                <a:schemeClr val="bg2">
+                  <a:lumMod val="40000"/>
+                  <a:lumOff val="60000"/>
+                </a:schemeClr>
+              </a:buClr>
+              <a:buSzPct val="80000"/>
+              <a:buFont typeface="Wingdings 3" charset="2"/>
+              <a:buChar char=""/>
+              <a:defRPr sz="2000" b="0" i="0" kern="1200">
+                <a:solidFill>
+                  <a:schemeClr val="tx1"/>
+                </a:solidFill>
+                <a:latin typeface="+mj-lt"/>
+                <a:ea typeface="+mj-ea"/>
+                <a:cs typeface="+mj-cs"/>
+              </a:defRPr>
+            </a:lvl1pPr>
+            <a:lvl2pPr marL="742950" indent="-285750" algn="l" defTabSz="457200" rtl="0" eaLnBrk="1" latinLnBrk="0" hangingPunct="1">
+              <a:spcBef>
+                <a:spcPts val="1000"/>
+              </a:spcBef>
+              <a:spcAft>
+                <a:spcPts val="0"/>
+              </a:spcAft>
+              <a:buClr>
+                <a:schemeClr val="bg2">
+                  <a:lumMod val="40000"/>
+                  <a:lumOff val="60000"/>
+                </a:schemeClr>
+              </a:buClr>
+              <a:buSzPct val="80000"/>
+              <a:buFont typeface="Wingdings 3" charset="2"/>
+              <a:buChar char=""/>
+              <a:defRPr sz="1800" b="0" i="0" kern="1200">
+                <a:solidFill>
+                  <a:schemeClr val="tx1"/>
+                </a:solidFill>
+                <a:latin typeface="+mj-lt"/>
+                <a:ea typeface="+mj-ea"/>
+                <a:cs typeface="+mj-cs"/>
+              </a:defRPr>
+            </a:lvl2pPr>
+            <a:lvl3pPr marL="1143000" indent="-228600" algn="l" defTabSz="457200" rtl="0" eaLnBrk="1" latinLnBrk="0" hangingPunct="1">
+              <a:spcBef>
+                <a:spcPts val="1000"/>
+              </a:spcBef>
+              <a:spcAft>
+                <a:spcPts val="0"/>
+              </a:spcAft>
+              <a:buClr>
+                <a:schemeClr val="bg2">
+                  <a:lumMod val="40000"/>
+                  <a:lumOff val="60000"/>
+                </a:schemeClr>
+              </a:buClr>
+              <a:buSzPct val="80000"/>
+              <a:buFont typeface="Wingdings 3" charset="2"/>
+              <a:buChar char=""/>
+              <a:defRPr sz="1600" b="0" i="0" kern="1200">
+                <a:solidFill>
+                  <a:schemeClr val="tx1"/>
+                </a:solidFill>
+                <a:latin typeface="+mj-lt"/>
+                <a:ea typeface="+mj-ea"/>
+                <a:cs typeface="+mj-cs"/>
+              </a:defRPr>
+            </a:lvl3pPr>
+            <a:lvl4pPr marL="1600200" indent="-228600" algn="l" defTabSz="457200" rtl="0" eaLnBrk="1" latinLnBrk="0" hangingPunct="1">
+              <a:spcBef>
+                <a:spcPts val="1000"/>
+              </a:spcBef>
+              <a:spcAft>
+                <a:spcPts val="0"/>
+              </a:spcAft>
+              <a:buClr>
+                <a:schemeClr val="bg2">
+                  <a:lumMod val="40000"/>
+                  <a:lumOff val="60000"/>
+                </a:schemeClr>
+              </a:buClr>
+              <a:buSzPct val="80000"/>
+              <a:buFont typeface="Wingdings 3" charset="2"/>
+              <a:buChar char=""/>
+              <a:defRPr sz="1400" b="0" i="0" kern="1200">
+                <a:solidFill>
+                  <a:schemeClr val="tx1"/>
+                </a:solidFill>
+                <a:latin typeface="+mj-lt"/>
+                <a:ea typeface="+mj-ea"/>
+                <a:cs typeface="+mj-cs"/>
+              </a:defRPr>
+            </a:lvl4pPr>
+            <a:lvl5pPr marL="2057400" indent="-228600" algn="l" defTabSz="457200" rtl="0" eaLnBrk="1" latinLnBrk="0" hangingPunct="1">
+              <a:spcBef>
+                <a:spcPts val="1000"/>
+              </a:spcBef>
+              <a:spcAft>
+                <a:spcPts val="0"/>
+              </a:spcAft>
+              <a:buClr>
+                <a:schemeClr val="bg2">
+                  <a:lumMod val="40000"/>
+                  <a:lumOff val="60000"/>
+                </a:schemeClr>
+              </a:buClr>
+              <a:buSzPct val="80000"/>
+              <a:buFont typeface="Wingdings 3" charset="2"/>
+              <a:buChar char=""/>
+              <a:defRPr sz="1400" b="0" i="0" kern="1200">
+                <a:solidFill>
+                  <a:schemeClr val="tx1"/>
+                </a:solidFill>
+                <a:latin typeface="+mj-lt"/>
+                <a:ea typeface="+mj-ea"/>
+                <a:cs typeface="+mj-cs"/>
+              </a:defRPr>
+            </a:lvl5pPr>
+            <a:lvl6pPr marL="2506000" indent="-228600" algn="l" defTabSz="457200" rtl="0" eaLnBrk="1" latinLnBrk="0" hangingPunct="1">
+              <a:spcBef>
+                <a:spcPts val="1000"/>
+              </a:spcBef>
+              <a:spcAft>
+                <a:spcPts val="0"/>
+              </a:spcAft>
+              <a:buClr>
+                <a:schemeClr val="bg2">
+                  <a:lumMod val="40000"/>
+                  <a:lumOff val="60000"/>
+                </a:schemeClr>
+              </a:buClr>
+              <a:buSzPct val="80000"/>
+              <a:buFont typeface="Wingdings 3" charset="2"/>
+              <a:buChar char=""/>
+              <a:defRPr sz="1400" b="0" i="0" kern="1200">
+                <a:solidFill>
+                  <a:schemeClr val="tx1"/>
+                </a:solidFill>
+                <a:latin typeface="+mj-lt"/>
+                <a:ea typeface="+mj-ea"/>
+                <a:cs typeface="+mj-cs"/>
+              </a:defRPr>
+            </a:lvl6pPr>
+            <a:lvl7pPr marL="2971800" indent="-228600" algn="l" defTabSz="457200" rtl="0" eaLnBrk="1" latinLnBrk="0" hangingPunct="1">
+              <a:spcBef>
+                <a:spcPts val="1000"/>
+              </a:spcBef>
+              <a:spcAft>
+                <a:spcPts val="0"/>
+              </a:spcAft>
+              <a:buClr>
+                <a:schemeClr val="bg2">
+                  <a:lumMod val="40000"/>
+                  <a:lumOff val="60000"/>
+                </a:schemeClr>
+              </a:buClr>
+              <a:buSzPct val="80000"/>
+              <a:buFont typeface="Wingdings 3" charset="2"/>
+              <a:buChar char=""/>
+              <a:defRPr sz="1400" b="0" i="0" kern="1200">
+                <a:solidFill>
+                  <a:schemeClr val="tx1"/>
+                </a:solidFill>
+                <a:latin typeface="+mj-lt"/>
+                <a:ea typeface="+mj-ea"/>
+                <a:cs typeface="+mj-cs"/>
+              </a:defRPr>
+            </a:lvl7pPr>
+            <a:lvl8pPr marL="3429000" indent="-228600" algn="l" defTabSz="457200" rtl="0" eaLnBrk="1" latinLnBrk="0" hangingPunct="1">
+              <a:spcBef>
+                <a:spcPts val="1000"/>
+              </a:spcBef>
+              <a:spcAft>
+                <a:spcPts val="0"/>
+              </a:spcAft>
+              <a:buClr>
+                <a:schemeClr val="bg2">
+                  <a:lumMod val="40000"/>
+                  <a:lumOff val="60000"/>
+                </a:schemeClr>
+              </a:buClr>
+              <a:buSzPct val="80000"/>
+              <a:buFont typeface="Wingdings 3" charset="2"/>
+              <a:buChar char=""/>
+              <a:defRPr sz="1400" b="0" i="0" kern="1200">
+                <a:solidFill>
+                  <a:schemeClr val="tx1"/>
+                </a:solidFill>
+                <a:latin typeface="+mj-lt"/>
+                <a:ea typeface="+mj-ea"/>
+                <a:cs typeface="+mj-cs"/>
+              </a:defRPr>
+            </a:lvl8pPr>
+            <a:lvl9pPr marL="3886200" indent="-228600" algn="l" defTabSz="457200" rtl="0" eaLnBrk="1" latinLnBrk="0" hangingPunct="1">
+              <a:spcBef>
+                <a:spcPts val="1000"/>
+              </a:spcBef>
+              <a:spcAft>
+                <a:spcPts val="0"/>
+              </a:spcAft>
+              <a:buClr>
+                <a:schemeClr val="bg2">
+                  <a:lumMod val="40000"/>
+                  <a:lumOff val="60000"/>
+                </a:schemeClr>
+              </a:buClr>
+              <a:buSzPct val="80000"/>
+              <a:buFont typeface="Wingdings 3" charset="2"/>
+              <a:buChar char=""/>
+              <a:defRPr sz="1400" b="0" i="0" kern="1200">
+                <a:solidFill>
+                  <a:schemeClr val="tx1"/>
+                </a:solidFill>
+                <a:latin typeface="+mj-lt"/>
+                <a:ea typeface="+mj-ea"/>
+                <a:cs typeface="+mj-cs"/>
+              </a:defRPr>
+            </a:lvl9pPr>
+          </a:lstStyle>
+          <a:p>
+            <a:r>
+              <a:rPr lang="en-GB" sz="1600" dirty="0"/>
+              <a:t>&lt; 25% selfish mining power:</a:t>
+            </a:r>
+          </a:p>
+          <a:p>
+            <a:pPr marL="0" indent="0">
+              <a:buNone/>
+            </a:pPr>
+            <a:r>
+              <a:rPr lang="en-GB" sz="1600" dirty="0"/>
+              <a:t>	- </a:t>
+            </a:r>
             <a:r>
               <a:rPr lang="en-US" sz="1600" dirty="0"/>
-              <a:t>Instable average profit of a selfish miner mostly between 0% and 0.01%.</a:t>
-            </a:r>
-          </a:p>
-          <a:p>
-            <a:pPr marL="457200" lvl="1" indent="0">
+              <a:t>Total selfish profit is more likely to be less 		than total honest profit </a:t>
+            </a:r>
+          </a:p>
+          <a:p>
+            <a:pPr marL="0" indent="0">
               <a:buNone/>
             </a:pPr>
-            <a:r>
-              <a:rPr lang="en-US" sz="1400" dirty="0"/>
-              <a:t>- Unfair distribution of profit among selfish miners. </a:t>
-            </a:r>
+            <a:endParaRPr lang="en-US" sz="1600" dirty="0"/>
+          </a:p>
+          <a:p>
+            <a:r>
+              <a:rPr lang="en-US" sz="1600" dirty="0"/>
+              <a:t>&gt;= 25% selfish mining power:</a:t>
+            </a:r>
+          </a:p>
+          <a:p>
+            <a:pPr marL="0" indent="0">
+              <a:buNone/>
+            </a:pPr>
+            <a:r>
+              <a:rPr lang="en-US" sz="1600" dirty="0"/>
+              <a:t>	- Profit of the selfish miner is highly 	competitive with the total honest profit 	generated by the other 99 honest miners.</a:t>
+            </a:r>
+          </a:p>
+          <a:p>
+            <a:endParaRPr lang="en-US" sz="1600" dirty="0"/>
+          </a:p>
+          <a:p>
+            <a:r>
+              <a:rPr lang="en-US" sz="1600" dirty="0"/>
+              <a:t>But does that mean selfish mining is a good strategy?</a:t>
+            </a:r>
+          </a:p>
+          <a:p>
+            <a:pPr marL="0" indent="0">
+              <a:buNone/>
+            </a:pPr>
+            <a:r>
+              <a:rPr lang="en-US" sz="1600" dirty="0"/>
+              <a:t>	- 1 selfish miner was able to claim from 0% 	to 40% of total profit for a mining power 	less than 25%.</a:t>
+            </a:r>
+          </a:p>
+          <a:p>
+            <a:pPr marL="0" indent="0">
+              <a:buFont typeface="Wingdings 3" charset="2"/>
+              <a:buNone/>
+            </a:pPr>
+            <a:endParaRPr lang="en-US" sz="1600" dirty="0"/>
           </a:p>
           <a:p>
             <a:pPr marL="0" indent="0">
@@ -7648,7 +8066,7 @@
           <p:cNvPr id="6" name="Plassholder for innhold 5">
             <a:extLst>
               <a:ext uri="{FF2B5EF4-FFF2-40B4-BE49-F238E27FC236}">
-                <a16:creationId xmlns:a16="http://schemas.microsoft.com/office/drawing/2014/main" id="{EAAE4CA6-C3F8-4581-A108-5CA27B22A5D3}"/>
+                <a16:creationId xmlns:a16="http://schemas.microsoft.com/office/drawing/2014/main" id="{1EF3F809-A243-4FD5-952D-25A8B81C0049}"/>
               </a:ext>
             </a:extLst>
           </p:cNvPr>
@@ -7660,44 +8078,1677 @@
           </p:nvPr>
         </p:nvPicPr>
         <p:blipFill>
-          <a:blip r:embed="rId2">
-            <a:extLst>
-              <a:ext uri="{28A0092B-C50C-407E-A947-70E740481C1C}">
-                <a14:useLocalDpi xmlns:a14="http://schemas.microsoft.com/office/drawing/2010/main" val="0"/>
-              </a:ext>
-            </a:extLst>
-          </a:blip>
+          <a:blip r:embed="rId2"/>
           <a:stretch>
             <a:fillRect/>
           </a:stretch>
         </p:blipFill>
         <p:spPr>
           <a:xfrm>
-            <a:off x="222905" y="1513002"/>
-            <a:ext cx="6083627" cy="4735398"/>
+            <a:off x="377072" y="1494148"/>
+            <a:ext cx="5953027" cy="5114042"/>
           </a:xfrm>
-          <a:prstGeom prst="roundRect">
-            <a:avLst>
-              <a:gd name="adj" fmla="val 8594"/>
-            </a:avLst>
+        </p:spPr>
+      </p:pic>
+    </p:spTree>
+    <p:extLst>
+      <p:ext uri="{BB962C8B-B14F-4D97-AF65-F5344CB8AC3E}">
+        <p14:creationId xmlns:p14="http://schemas.microsoft.com/office/powerpoint/2010/main" val="162690125"/>
+      </p:ext>
+    </p:extLst>
+  </p:cSld>
+  <p:clrMapOvr>
+    <a:masterClrMapping/>
+  </p:clrMapOvr>
+</p:sld>
+</file>
+
+<file path=ppt/slides/slide5.xml><?xml version="1.0" encoding="utf-8"?>
+<p:sld xmlns:a="http://schemas.openxmlformats.org/drawingml/2006/main" xmlns:r="http://schemas.openxmlformats.org/officeDocument/2006/relationships" xmlns:p="http://schemas.openxmlformats.org/presentationml/2006/main">
+  <p:cSld>
+    <p:spTree>
+      <p:nvGrpSpPr>
+        <p:cNvPr id="1" name=""/>
+        <p:cNvGrpSpPr/>
+        <p:nvPr/>
+      </p:nvGrpSpPr>
+      <p:grpSpPr>
+        <a:xfrm>
+          <a:off x="0" y="0"/>
+          <a:ext cx="0" cy="0"/>
+          <a:chOff x="0" y="0"/>
+          <a:chExt cx="0" cy="0"/>
+        </a:xfrm>
+      </p:grpSpPr>
+      <p:sp>
+        <p:nvSpPr>
+          <p:cNvPr id="2" name="Tittel 1">
+            <a:extLst>
+              <a:ext uri="{FF2B5EF4-FFF2-40B4-BE49-F238E27FC236}">
+                <a16:creationId xmlns:a16="http://schemas.microsoft.com/office/drawing/2014/main" id="{18C31D7D-A525-476E-B726-B49BDCDB2078}"/>
+              </a:ext>
+            </a:extLst>
+          </p:cNvPr>
+          <p:cNvSpPr>
+            <a:spLocks noGrp="1"/>
+          </p:cNvSpPr>
+          <p:nvPr>
+            <p:ph type="title"/>
+          </p:nvPr>
+        </p:nvSpPr>
+        <p:spPr>
+          <a:xfrm>
+            <a:off x="646111" y="452718"/>
+            <a:ext cx="9404723" cy="909551"/>
+          </a:xfrm>
+        </p:spPr>
+        <p:txBody>
+          <a:bodyPr/>
+          <a:lstStyle/>
+          <a:p>
+            <a:r>
+              <a:rPr lang="en-GB" sz="1600" dirty="0"/>
+              <a:t>Analysis of mining power </a:t>
+            </a:r>
+            <a:br>
+              <a:rPr lang="en-GB" dirty="0"/>
+            </a:br>
+            <a:r>
+              <a:rPr lang="en-GB" dirty="0"/>
+              <a:t>Simulation nr. 2 - Setup</a:t>
+            </a:r>
+          </a:p>
+        </p:txBody>
+      </p:sp>
+      <p:sp>
+        <p:nvSpPr>
+          <p:cNvPr id="3" name="Plassholder for innhold 2">
+            <a:extLst>
+              <a:ext uri="{FF2B5EF4-FFF2-40B4-BE49-F238E27FC236}">
+                <a16:creationId xmlns:a16="http://schemas.microsoft.com/office/drawing/2014/main" id="{A3D68D6D-CD3E-4CB1-BBA5-1AA2A6400C9D}"/>
+              </a:ext>
+            </a:extLst>
+          </p:cNvPr>
+          <p:cNvSpPr>
+            <a:spLocks noGrp="1"/>
+          </p:cNvSpPr>
+          <p:nvPr>
+            <p:ph idx="1"/>
+          </p:nvPr>
+        </p:nvSpPr>
+        <p:spPr>
+          <a:xfrm>
+            <a:off x="1103312" y="1408922"/>
+            <a:ext cx="10028108" cy="5075854"/>
+          </a:xfrm>
+        </p:spPr>
+        <p:txBody>
+          <a:bodyPr>
+            <a:noAutofit/>
+          </a:bodyPr>
+          <a:lstStyle/>
+          <a:p>
+            <a:r>
+              <a:rPr lang="en-US" sz="1400" dirty="0"/>
+              <a:t>Studying the effect of an increasing number of selfish miners where all individual honest and selfish miners have equal mining power</a:t>
+            </a:r>
+            <a:r>
+              <a:rPr lang="en-US" sz="1600" dirty="0"/>
+              <a:t>.</a:t>
+            </a:r>
+          </a:p>
+          <a:p>
+            <a:endParaRPr lang="en-US" sz="1600" dirty="0"/>
+          </a:p>
+          <a:p>
+            <a:r>
+              <a:rPr lang="en-US" sz="1600" dirty="0"/>
+              <a:t>Having:</a:t>
+            </a:r>
+          </a:p>
+          <a:p>
+            <a:pPr marL="0" indent="0">
+              <a:buNone/>
+            </a:pPr>
+            <a:r>
+              <a:rPr lang="en-US" sz="1600" dirty="0"/>
+              <a:t>	- 100 in total mining power and 100 miners.</a:t>
+            </a:r>
+          </a:p>
+          <a:p>
+            <a:pPr marL="0" indent="0">
+              <a:buNone/>
+            </a:pPr>
+            <a:r>
+              <a:rPr lang="en-US" sz="1600" dirty="0"/>
+              <a:t>	- Every miner always has an equal mining power of 1.</a:t>
+            </a:r>
+          </a:p>
+          <a:p>
+            <a:pPr marL="0" indent="0">
+              <a:buNone/>
+            </a:pPr>
+            <a:r>
+              <a:rPr lang="en-US" sz="1600" dirty="0"/>
+              <a:t>	- Network power is random in case of blockchain forks.</a:t>
+            </a:r>
+          </a:p>
+          <a:p>
+            <a:pPr marL="0" indent="0">
+              <a:buNone/>
+            </a:pPr>
+            <a:endParaRPr lang="en-US" sz="1600" dirty="0"/>
+          </a:p>
+          <a:p>
+            <a:r>
+              <a:rPr lang="en-US" sz="1600" dirty="0"/>
+              <a:t>We start the selfish mining power at 0% (0 selfish miners) </a:t>
+            </a:r>
+          </a:p>
+          <a:p>
+            <a:pPr marL="0" indent="0">
+              <a:buNone/>
+            </a:pPr>
+            <a:r>
+              <a:rPr lang="en-US" sz="1600" dirty="0"/>
+              <a:t>	And the honest mining power at 100% (100 honest miners). </a:t>
+            </a:r>
+          </a:p>
+          <a:p>
+            <a:endParaRPr lang="en-US" sz="1600" dirty="0"/>
+          </a:p>
+          <a:p>
+            <a:r>
+              <a:rPr lang="en-US" sz="1600" dirty="0"/>
+              <a:t>We run the simulation for 60 steps, and at each step:</a:t>
+            </a:r>
+          </a:p>
+          <a:p>
+            <a:pPr marL="0" indent="0">
+              <a:buNone/>
+            </a:pPr>
+            <a:r>
+              <a:rPr lang="en-US" sz="1600" dirty="0"/>
+              <a:t>	- Increasing the selfish mining power by increasing the number of selfish miners by 1.</a:t>
+            </a:r>
+          </a:p>
+          <a:p>
+            <a:pPr marL="0" indent="0">
+              <a:buNone/>
+            </a:pPr>
+            <a:r>
+              <a:rPr lang="en-US" sz="1600" dirty="0"/>
+              <a:t>	- Decreasing the honest mining power by decreasing the number of honest miners by 1.</a:t>
+            </a:r>
+          </a:p>
+          <a:p>
+            <a:pPr marL="0" indent="0">
+              <a:buNone/>
+            </a:pPr>
+            <a:endParaRPr lang="en-US" sz="1600" dirty="0"/>
+          </a:p>
+          <a:p>
+            <a:pPr marL="0" indent="0">
+              <a:buNone/>
+            </a:pPr>
+            <a:r>
+              <a:rPr lang="en-US" sz="1600" dirty="0"/>
+              <a:t> </a:t>
+            </a:r>
+            <a:endParaRPr lang="en-GB" sz="1600" dirty="0"/>
+          </a:p>
+        </p:txBody>
+      </p:sp>
+    </p:spTree>
+    <p:extLst>
+      <p:ext uri="{BB962C8B-B14F-4D97-AF65-F5344CB8AC3E}">
+        <p14:creationId xmlns:p14="http://schemas.microsoft.com/office/powerpoint/2010/main" val="3325810243"/>
+      </p:ext>
+    </p:extLst>
+  </p:cSld>
+  <p:clrMapOvr>
+    <a:masterClrMapping/>
+  </p:clrMapOvr>
+</p:sld>
+</file>
+
+<file path=ppt/slides/slide6.xml><?xml version="1.0" encoding="utf-8"?>
+<p:sld xmlns:a="http://schemas.openxmlformats.org/drawingml/2006/main" xmlns:r="http://schemas.openxmlformats.org/officeDocument/2006/relationships" xmlns:p="http://schemas.openxmlformats.org/presentationml/2006/main">
+  <p:cSld>
+    <p:spTree>
+      <p:nvGrpSpPr>
+        <p:cNvPr id="1" name=""/>
+        <p:cNvGrpSpPr/>
+        <p:nvPr/>
+      </p:nvGrpSpPr>
+      <p:grpSpPr>
+        <a:xfrm>
+          <a:off x="0" y="0"/>
+          <a:ext cx="0" cy="0"/>
+          <a:chOff x="0" y="0"/>
+          <a:chExt cx="0" cy="0"/>
+        </a:xfrm>
+      </p:grpSpPr>
+      <p:sp>
+        <p:nvSpPr>
+          <p:cNvPr id="2" name="Tittel 1">
+            <a:extLst>
+              <a:ext uri="{FF2B5EF4-FFF2-40B4-BE49-F238E27FC236}">
+                <a16:creationId xmlns:a16="http://schemas.microsoft.com/office/drawing/2014/main" id="{18C31D7D-A525-476E-B726-B49BDCDB2078}"/>
+              </a:ext>
+            </a:extLst>
+          </p:cNvPr>
+          <p:cNvSpPr>
+            <a:spLocks noGrp="1"/>
+          </p:cNvSpPr>
+          <p:nvPr>
+            <p:ph type="title"/>
+          </p:nvPr>
+        </p:nvSpPr>
+        <p:spPr>
+          <a:xfrm>
+            <a:off x="646111" y="452718"/>
+            <a:ext cx="9404723" cy="909551"/>
+          </a:xfrm>
+        </p:spPr>
+        <p:txBody>
+          <a:bodyPr/>
+          <a:lstStyle/>
+          <a:p>
+            <a:r>
+              <a:rPr lang="en-GB" sz="1600" dirty="0"/>
+              <a:t>Analysis of mining power </a:t>
+            </a:r>
+            <a:br>
+              <a:rPr lang="en-GB" dirty="0"/>
+            </a:br>
+            <a:r>
+              <a:rPr lang="en-GB" dirty="0"/>
+              <a:t>Simulation nr. 2 – Results &amp; Analysis</a:t>
+            </a:r>
+          </a:p>
+        </p:txBody>
+      </p:sp>
+      <p:sp>
+        <p:nvSpPr>
+          <p:cNvPr id="10" name="Plassholder for innhold 2">
+            <a:extLst>
+              <a:ext uri="{FF2B5EF4-FFF2-40B4-BE49-F238E27FC236}">
+                <a16:creationId xmlns:a16="http://schemas.microsoft.com/office/drawing/2014/main" id="{7F861BE9-0CDC-441E-B0B8-80D81F938C07}"/>
+              </a:ext>
+            </a:extLst>
+          </p:cNvPr>
+          <p:cNvSpPr txBox="1">
+            <a:spLocks/>
+          </p:cNvSpPr>
+          <p:nvPr/>
+        </p:nvSpPr>
+        <p:spPr>
+          <a:xfrm>
+            <a:off x="6485640" y="1423447"/>
+            <a:ext cx="5434553" cy="5307291"/>
+          </a:xfrm>
+          <a:prstGeom prst="rect">
+            <a:avLst/>
           </a:prstGeom>
-          <a:solidFill>
-            <a:srgbClr val="FFFFFF">
-              <a:shade val="85000"/>
-            </a:srgbClr>
-          </a:solidFill>
-          <a:ln>
-            <a:noFill/>
-          </a:ln>
-          <a:effectLst>
-            <a:reflection blurRad="12700" stA="38000" endPos="28000" dist="5000" dir="5400000" sy="-100000" algn="bl" rotWithShape="0"/>
-          </a:effectLst>
+        </p:spPr>
+        <p:txBody>
+          <a:bodyPr vert="horz" lIns="91440" tIns="45720" rIns="91440" bIns="45720" rtlCol="0">
+            <a:noAutofit/>
+          </a:bodyPr>
+          <a:lstStyle>
+            <a:lvl1pPr marL="342900" indent="-342900" algn="l" defTabSz="457200" rtl="0" eaLnBrk="1" latinLnBrk="0" hangingPunct="1">
+              <a:spcBef>
+                <a:spcPts val="1000"/>
+              </a:spcBef>
+              <a:spcAft>
+                <a:spcPts val="0"/>
+              </a:spcAft>
+              <a:buClr>
+                <a:schemeClr val="bg2">
+                  <a:lumMod val="40000"/>
+                  <a:lumOff val="60000"/>
+                </a:schemeClr>
+              </a:buClr>
+              <a:buSzPct val="80000"/>
+              <a:buFont typeface="Wingdings 3" charset="2"/>
+              <a:buChar char=""/>
+              <a:defRPr sz="2000" b="0" i="0" kern="1200">
+                <a:solidFill>
+                  <a:schemeClr val="tx1"/>
+                </a:solidFill>
+                <a:latin typeface="+mj-lt"/>
+                <a:ea typeface="+mj-ea"/>
+                <a:cs typeface="+mj-cs"/>
+              </a:defRPr>
+            </a:lvl1pPr>
+            <a:lvl2pPr marL="742950" indent="-285750" algn="l" defTabSz="457200" rtl="0" eaLnBrk="1" latinLnBrk="0" hangingPunct="1">
+              <a:spcBef>
+                <a:spcPts val="1000"/>
+              </a:spcBef>
+              <a:spcAft>
+                <a:spcPts val="0"/>
+              </a:spcAft>
+              <a:buClr>
+                <a:schemeClr val="bg2">
+                  <a:lumMod val="40000"/>
+                  <a:lumOff val="60000"/>
+                </a:schemeClr>
+              </a:buClr>
+              <a:buSzPct val="80000"/>
+              <a:buFont typeface="Wingdings 3" charset="2"/>
+              <a:buChar char=""/>
+              <a:defRPr sz="1800" b="0" i="0" kern="1200">
+                <a:solidFill>
+                  <a:schemeClr val="tx1"/>
+                </a:solidFill>
+                <a:latin typeface="+mj-lt"/>
+                <a:ea typeface="+mj-ea"/>
+                <a:cs typeface="+mj-cs"/>
+              </a:defRPr>
+            </a:lvl2pPr>
+            <a:lvl3pPr marL="1143000" indent="-228600" algn="l" defTabSz="457200" rtl="0" eaLnBrk="1" latinLnBrk="0" hangingPunct="1">
+              <a:spcBef>
+                <a:spcPts val="1000"/>
+              </a:spcBef>
+              <a:spcAft>
+                <a:spcPts val="0"/>
+              </a:spcAft>
+              <a:buClr>
+                <a:schemeClr val="bg2">
+                  <a:lumMod val="40000"/>
+                  <a:lumOff val="60000"/>
+                </a:schemeClr>
+              </a:buClr>
+              <a:buSzPct val="80000"/>
+              <a:buFont typeface="Wingdings 3" charset="2"/>
+              <a:buChar char=""/>
+              <a:defRPr sz="1600" b="0" i="0" kern="1200">
+                <a:solidFill>
+                  <a:schemeClr val="tx1"/>
+                </a:solidFill>
+                <a:latin typeface="+mj-lt"/>
+                <a:ea typeface="+mj-ea"/>
+                <a:cs typeface="+mj-cs"/>
+              </a:defRPr>
+            </a:lvl3pPr>
+            <a:lvl4pPr marL="1600200" indent="-228600" algn="l" defTabSz="457200" rtl="0" eaLnBrk="1" latinLnBrk="0" hangingPunct="1">
+              <a:spcBef>
+                <a:spcPts val="1000"/>
+              </a:spcBef>
+              <a:spcAft>
+                <a:spcPts val="0"/>
+              </a:spcAft>
+              <a:buClr>
+                <a:schemeClr val="bg2">
+                  <a:lumMod val="40000"/>
+                  <a:lumOff val="60000"/>
+                </a:schemeClr>
+              </a:buClr>
+              <a:buSzPct val="80000"/>
+              <a:buFont typeface="Wingdings 3" charset="2"/>
+              <a:buChar char=""/>
+              <a:defRPr sz="1400" b="0" i="0" kern="1200">
+                <a:solidFill>
+                  <a:schemeClr val="tx1"/>
+                </a:solidFill>
+                <a:latin typeface="+mj-lt"/>
+                <a:ea typeface="+mj-ea"/>
+                <a:cs typeface="+mj-cs"/>
+              </a:defRPr>
+            </a:lvl4pPr>
+            <a:lvl5pPr marL="2057400" indent="-228600" algn="l" defTabSz="457200" rtl="0" eaLnBrk="1" latinLnBrk="0" hangingPunct="1">
+              <a:spcBef>
+                <a:spcPts val="1000"/>
+              </a:spcBef>
+              <a:spcAft>
+                <a:spcPts val="0"/>
+              </a:spcAft>
+              <a:buClr>
+                <a:schemeClr val="bg2">
+                  <a:lumMod val="40000"/>
+                  <a:lumOff val="60000"/>
+                </a:schemeClr>
+              </a:buClr>
+              <a:buSzPct val="80000"/>
+              <a:buFont typeface="Wingdings 3" charset="2"/>
+              <a:buChar char=""/>
+              <a:defRPr sz="1400" b="0" i="0" kern="1200">
+                <a:solidFill>
+                  <a:schemeClr val="tx1"/>
+                </a:solidFill>
+                <a:latin typeface="+mj-lt"/>
+                <a:ea typeface="+mj-ea"/>
+                <a:cs typeface="+mj-cs"/>
+              </a:defRPr>
+            </a:lvl5pPr>
+            <a:lvl6pPr marL="2506000" indent="-228600" algn="l" defTabSz="457200" rtl="0" eaLnBrk="1" latinLnBrk="0" hangingPunct="1">
+              <a:spcBef>
+                <a:spcPts val="1000"/>
+              </a:spcBef>
+              <a:spcAft>
+                <a:spcPts val="0"/>
+              </a:spcAft>
+              <a:buClr>
+                <a:schemeClr val="bg2">
+                  <a:lumMod val="40000"/>
+                  <a:lumOff val="60000"/>
+                </a:schemeClr>
+              </a:buClr>
+              <a:buSzPct val="80000"/>
+              <a:buFont typeface="Wingdings 3" charset="2"/>
+              <a:buChar char=""/>
+              <a:defRPr sz="1400" b="0" i="0" kern="1200">
+                <a:solidFill>
+                  <a:schemeClr val="tx1"/>
+                </a:solidFill>
+                <a:latin typeface="+mj-lt"/>
+                <a:ea typeface="+mj-ea"/>
+                <a:cs typeface="+mj-cs"/>
+              </a:defRPr>
+            </a:lvl6pPr>
+            <a:lvl7pPr marL="2971800" indent="-228600" algn="l" defTabSz="457200" rtl="0" eaLnBrk="1" latinLnBrk="0" hangingPunct="1">
+              <a:spcBef>
+                <a:spcPts val="1000"/>
+              </a:spcBef>
+              <a:spcAft>
+                <a:spcPts val="0"/>
+              </a:spcAft>
+              <a:buClr>
+                <a:schemeClr val="bg2">
+                  <a:lumMod val="40000"/>
+                  <a:lumOff val="60000"/>
+                </a:schemeClr>
+              </a:buClr>
+              <a:buSzPct val="80000"/>
+              <a:buFont typeface="Wingdings 3" charset="2"/>
+              <a:buChar char=""/>
+              <a:defRPr sz="1400" b="0" i="0" kern="1200">
+                <a:solidFill>
+                  <a:schemeClr val="tx1"/>
+                </a:solidFill>
+                <a:latin typeface="+mj-lt"/>
+                <a:ea typeface="+mj-ea"/>
+                <a:cs typeface="+mj-cs"/>
+              </a:defRPr>
+            </a:lvl7pPr>
+            <a:lvl8pPr marL="3429000" indent="-228600" algn="l" defTabSz="457200" rtl="0" eaLnBrk="1" latinLnBrk="0" hangingPunct="1">
+              <a:spcBef>
+                <a:spcPts val="1000"/>
+              </a:spcBef>
+              <a:spcAft>
+                <a:spcPts val="0"/>
+              </a:spcAft>
+              <a:buClr>
+                <a:schemeClr val="bg2">
+                  <a:lumMod val="40000"/>
+                  <a:lumOff val="60000"/>
+                </a:schemeClr>
+              </a:buClr>
+              <a:buSzPct val="80000"/>
+              <a:buFont typeface="Wingdings 3" charset="2"/>
+              <a:buChar char=""/>
+              <a:defRPr sz="1400" b="0" i="0" kern="1200">
+                <a:solidFill>
+                  <a:schemeClr val="tx1"/>
+                </a:solidFill>
+                <a:latin typeface="+mj-lt"/>
+                <a:ea typeface="+mj-ea"/>
+                <a:cs typeface="+mj-cs"/>
+              </a:defRPr>
+            </a:lvl8pPr>
+            <a:lvl9pPr marL="3886200" indent="-228600" algn="l" defTabSz="457200" rtl="0" eaLnBrk="1" latinLnBrk="0" hangingPunct="1">
+              <a:spcBef>
+                <a:spcPts val="1000"/>
+              </a:spcBef>
+              <a:spcAft>
+                <a:spcPts val="0"/>
+              </a:spcAft>
+              <a:buClr>
+                <a:schemeClr val="bg2">
+                  <a:lumMod val="40000"/>
+                  <a:lumOff val="60000"/>
+                </a:schemeClr>
+              </a:buClr>
+              <a:buSzPct val="80000"/>
+              <a:buFont typeface="Wingdings 3" charset="2"/>
+              <a:buChar char=""/>
+              <a:defRPr sz="1400" b="0" i="0" kern="1200">
+                <a:solidFill>
+                  <a:schemeClr val="tx1"/>
+                </a:solidFill>
+                <a:latin typeface="+mj-lt"/>
+                <a:ea typeface="+mj-ea"/>
+                <a:cs typeface="+mj-cs"/>
+              </a:defRPr>
+            </a:lvl9pPr>
+          </a:lstStyle>
+          <a:p>
+            <a:r>
+              <a:rPr lang="en-GB" sz="1600" dirty="0"/>
+              <a:t>From 0% (0 selfish miners) to 50% (50 selfish miners) selfish mining power</a:t>
+            </a:r>
+          </a:p>
+          <a:p>
+            <a:pPr marL="0" indent="0">
+              <a:buNone/>
+            </a:pPr>
+            <a:r>
+              <a:rPr lang="en-GB" sz="1600" dirty="0"/>
+              <a:t>	- Increasing selfish profit</a:t>
+            </a:r>
+          </a:p>
+          <a:p>
+            <a:pPr marL="0" indent="0">
+              <a:buNone/>
+            </a:pPr>
+            <a:endParaRPr lang="en-US" sz="1600" dirty="0"/>
+          </a:p>
+          <a:p>
+            <a:r>
+              <a:rPr lang="en-US" sz="1600" dirty="0"/>
+              <a:t>From 100% (100 honest miners) to 40% (40 honest miners) honest mining power</a:t>
+            </a:r>
+          </a:p>
+          <a:p>
+            <a:pPr marL="0" indent="0">
+              <a:buNone/>
+            </a:pPr>
+            <a:r>
+              <a:rPr lang="en-US" sz="1600" dirty="0"/>
+              <a:t>	- Decreasing honest profit	</a:t>
+            </a:r>
+          </a:p>
+          <a:p>
+            <a:pPr marL="0" indent="0">
+              <a:buNone/>
+            </a:pPr>
+            <a:endParaRPr lang="en-US" sz="1600" dirty="0"/>
+          </a:p>
+          <a:p>
+            <a:r>
+              <a:rPr lang="en-US" sz="1600" dirty="0"/>
+              <a:t>Stable average profit of an honest miner at 1%.</a:t>
+            </a:r>
+          </a:p>
+          <a:p>
+            <a:pPr marL="0" indent="0">
+              <a:buNone/>
+            </a:pPr>
+            <a:r>
+              <a:rPr lang="en-US" sz="1600" dirty="0"/>
+              <a:t>	- Good/Fair distribution of profit among miners.</a:t>
+            </a:r>
+          </a:p>
+          <a:p>
+            <a:pPr marL="0" indent="0">
+              <a:buNone/>
+            </a:pPr>
+            <a:r>
+              <a:rPr lang="en-US" sz="1600" dirty="0"/>
+              <a:t> </a:t>
+            </a:r>
+          </a:p>
+          <a:p>
+            <a:r>
+              <a:rPr lang="en-US" sz="1600" dirty="0"/>
+              <a:t>Instable average profit of a selfish miner mostly between 0% and 1%.</a:t>
+            </a:r>
+          </a:p>
+          <a:p>
+            <a:pPr lvl="1">
+              <a:buFontTx/>
+              <a:buChar char="-"/>
+            </a:pPr>
+            <a:r>
+              <a:rPr lang="en-US" sz="1400" dirty="0"/>
+              <a:t>Unfair distribution of profit among selfish miners. </a:t>
+            </a:r>
+          </a:p>
+          <a:p>
+            <a:pPr lvl="1">
+              <a:buFontTx/>
+              <a:buChar char="-"/>
+            </a:pPr>
+            <a:r>
+              <a:rPr lang="en-US" sz="1400" dirty="0"/>
+              <a:t>Small exceptions might appear, like at 5% mining power.</a:t>
+            </a:r>
+          </a:p>
+          <a:p>
+            <a:pPr marL="0" indent="0">
+              <a:buFont typeface="Wingdings 3" charset="2"/>
+              <a:buNone/>
+            </a:pPr>
+            <a:r>
+              <a:rPr lang="en-US" sz="1600" dirty="0"/>
+              <a:t> </a:t>
+            </a:r>
+            <a:endParaRPr lang="en-GB" sz="1600" dirty="0"/>
+          </a:p>
+        </p:txBody>
+      </p:sp>
+      <p:pic>
+        <p:nvPicPr>
+          <p:cNvPr id="9" name="Bilde 8">
+            <a:extLst>
+              <a:ext uri="{FF2B5EF4-FFF2-40B4-BE49-F238E27FC236}">
+                <a16:creationId xmlns:a16="http://schemas.microsoft.com/office/drawing/2014/main" id="{C83FD5E7-10D7-4C00-8939-E4A78E92682B}"/>
+              </a:ext>
+            </a:extLst>
+          </p:cNvPr>
+          <p:cNvPicPr>
+            <a:picLocks noChangeAspect="1"/>
+          </p:cNvPicPr>
+          <p:nvPr/>
+        </p:nvPicPr>
+        <p:blipFill>
+          <a:blip r:embed="rId2"/>
+          <a:stretch>
+            <a:fillRect/>
+          </a:stretch>
+        </p:blipFill>
+        <p:spPr>
+          <a:xfrm>
+            <a:off x="174395" y="1508287"/>
+            <a:ext cx="6254685" cy="5137610"/>
+          </a:xfrm>
+          <a:prstGeom prst="rect">
+            <a:avLst/>
+          </a:prstGeom>
         </p:spPr>
       </p:pic>
     </p:spTree>
     <p:extLst>
       <p:ext uri="{BB962C8B-B14F-4D97-AF65-F5344CB8AC3E}">
         <p14:creationId xmlns:p14="http://schemas.microsoft.com/office/powerpoint/2010/main" val="2872873095"/>
+      </p:ext>
+    </p:extLst>
+  </p:cSld>
+  <p:clrMapOvr>
+    <a:masterClrMapping/>
+  </p:clrMapOvr>
+</p:sld>
+</file>
+
+<file path=ppt/slides/slide7.xml><?xml version="1.0" encoding="utf-8"?>
+<p:sld xmlns:a="http://schemas.openxmlformats.org/drawingml/2006/main" xmlns:r="http://schemas.openxmlformats.org/officeDocument/2006/relationships" xmlns:p="http://schemas.openxmlformats.org/presentationml/2006/main">
+  <p:cSld>
+    <p:spTree>
+      <p:nvGrpSpPr>
+        <p:cNvPr id="1" name=""/>
+        <p:cNvGrpSpPr/>
+        <p:nvPr/>
+      </p:nvGrpSpPr>
+      <p:grpSpPr>
+        <a:xfrm>
+          <a:off x="0" y="0"/>
+          <a:ext cx="0" cy="0"/>
+          <a:chOff x="0" y="0"/>
+          <a:chExt cx="0" cy="0"/>
+        </a:xfrm>
+      </p:grpSpPr>
+      <p:sp>
+        <p:nvSpPr>
+          <p:cNvPr id="2" name="Tittel 1">
+            <a:extLst>
+              <a:ext uri="{FF2B5EF4-FFF2-40B4-BE49-F238E27FC236}">
+                <a16:creationId xmlns:a16="http://schemas.microsoft.com/office/drawing/2014/main" id="{18C31D7D-A525-476E-B726-B49BDCDB2078}"/>
+              </a:ext>
+            </a:extLst>
+          </p:cNvPr>
+          <p:cNvSpPr>
+            <a:spLocks noGrp="1"/>
+          </p:cNvSpPr>
+          <p:nvPr>
+            <p:ph type="title"/>
+          </p:nvPr>
+        </p:nvSpPr>
+        <p:spPr>
+          <a:xfrm>
+            <a:off x="646111" y="452718"/>
+            <a:ext cx="9404723" cy="909551"/>
+          </a:xfrm>
+        </p:spPr>
+        <p:txBody>
+          <a:bodyPr/>
+          <a:lstStyle/>
+          <a:p>
+            <a:r>
+              <a:rPr lang="en-GB" sz="1600" dirty="0"/>
+              <a:t>Analysis of network power </a:t>
+            </a:r>
+            <a:br>
+              <a:rPr lang="en-GB" dirty="0"/>
+            </a:br>
+            <a:r>
+              <a:rPr lang="en-GB" dirty="0"/>
+              <a:t>Simulation nr. 3 - Setup</a:t>
+            </a:r>
+          </a:p>
+        </p:txBody>
+      </p:sp>
+      <p:sp>
+        <p:nvSpPr>
+          <p:cNvPr id="3" name="Plassholder for innhold 2">
+            <a:extLst>
+              <a:ext uri="{FF2B5EF4-FFF2-40B4-BE49-F238E27FC236}">
+                <a16:creationId xmlns:a16="http://schemas.microsoft.com/office/drawing/2014/main" id="{A3D68D6D-CD3E-4CB1-BBA5-1AA2A6400C9D}"/>
+              </a:ext>
+            </a:extLst>
+          </p:cNvPr>
+          <p:cNvSpPr>
+            <a:spLocks noGrp="1"/>
+          </p:cNvSpPr>
+          <p:nvPr>
+            <p:ph idx="1"/>
+          </p:nvPr>
+        </p:nvSpPr>
+        <p:spPr>
+          <a:xfrm>
+            <a:off x="681135" y="1362270"/>
+            <a:ext cx="10450285" cy="5262466"/>
+          </a:xfrm>
+        </p:spPr>
+        <p:txBody>
+          <a:bodyPr>
+            <a:noAutofit/>
+          </a:bodyPr>
+          <a:lstStyle/>
+          <a:p>
+            <a:r>
+              <a:rPr lang="en-GB" sz="1600" dirty="0"/>
+              <a:t>S</a:t>
+            </a:r>
+            <a:r>
+              <a:rPr lang="en-US" sz="1600" dirty="0" err="1"/>
+              <a:t>tudying</a:t>
+            </a:r>
+            <a:r>
+              <a:rPr lang="en-US" sz="1600" dirty="0"/>
+              <a:t> the effect of an increasing network power of just one selfish miner.</a:t>
+            </a:r>
+          </a:p>
+          <a:p>
+            <a:endParaRPr lang="en-US" sz="1600" dirty="0"/>
+          </a:p>
+          <a:p>
+            <a:r>
+              <a:rPr lang="en-US" sz="1600" dirty="0"/>
+              <a:t>Having:</a:t>
+            </a:r>
+          </a:p>
+          <a:p>
+            <a:pPr marL="0" indent="0">
+              <a:buNone/>
+            </a:pPr>
+            <a:r>
+              <a:rPr lang="en-US" sz="1600" dirty="0"/>
+              <a:t>	- 100 in total network power and 100 miners.</a:t>
+            </a:r>
+          </a:p>
+          <a:p>
+            <a:pPr marL="0" indent="0">
+              <a:buNone/>
+            </a:pPr>
+            <a:r>
+              <a:rPr lang="en-US" sz="1600" dirty="0"/>
+              <a:t>	- 99 honest miners.</a:t>
+            </a:r>
+          </a:p>
+          <a:p>
+            <a:pPr marL="0" indent="0">
+              <a:buNone/>
+            </a:pPr>
+            <a:r>
+              <a:rPr lang="en-US" sz="1600" dirty="0"/>
+              <a:t>	- 1 selfish miner.</a:t>
+            </a:r>
+          </a:p>
+          <a:p>
+            <a:pPr marL="0" indent="0">
+              <a:buNone/>
+            </a:pPr>
+            <a:r>
+              <a:rPr lang="en-US" sz="1600" dirty="0"/>
+              <a:t>	- Network power is weighted random.</a:t>
+            </a:r>
+          </a:p>
+          <a:p>
+            <a:pPr marL="0" indent="0">
+              <a:buNone/>
+            </a:pPr>
+            <a:r>
+              <a:rPr lang="en-US" sz="1600" dirty="0"/>
+              <a:t>	- Mining power is equal for all miners to isolate its effect on mining.</a:t>
+            </a:r>
+          </a:p>
+          <a:p>
+            <a:pPr marL="0" indent="0">
+              <a:buNone/>
+            </a:pPr>
+            <a:endParaRPr lang="en-US" sz="1600" dirty="0"/>
+          </a:p>
+          <a:p>
+            <a:r>
+              <a:rPr lang="en-US" sz="1600" dirty="0"/>
+              <a:t>We start the selfish network power at 0% and the honest network power at 100%.</a:t>
+            </a:r>
+          </a:p>
+          <a:p>
+            <a:endParaRPr lang="en-US" sz="1600" dirty="0"/>
+          </a:p>
+          <a:p>
+            <a:r>
+              <a:rPr lang="en-US" sz="1600" dirty="0"/>
+              <a:t>We run the simulation for 100 steps, and at each step:</a:t>
+            </a:r>
+          </a:p>
+          <a:p>
+            <a:pPr marL="0" indent="0">
+              <a:buNone/>
+            </a:pPr>
+            <a:r>
+              <a:rPr lang="en-US" sz="1600" dirty="0"/>
+              <a:t>	- Increasing the selfish network power by 1.</a:t>
+            </a:r>
+          </a:p>
+          <a:p>
+            <a:pPr marL="0" indent="0">
+              <a:buNone/>
+            </a:pPr>
+            <a:r>
+              <a:rPr lang="en-US" sz="1600" dirty="0"/>
+              <a:t>	- Decreasing the honest network power by 1. </a:t>
+            </a:r>
+          </a:p>
+          <a:p>
+            <a:pPr marL="0" indent="0">
+              <a:buNone/>
+            </a:pPr>
+            <a:endParaRPr lang="en-US" sz="1600" dirty="0"/>
+          </a:p>
+          <a:p>
+            <a:pPr marL="0" indent="0">
+              <a:buNone/>
+            </a:pPr>
+            <a:r>
+              <a:rPr lang="en-US" sz="1600" dirty="0"/>
+              <a:t> </a:t>
+            </a:r>
+            <a:endParaRPr lang="en-GB" sz="1600" dirty="0"/>
+          </a:p>
+        </p:txBody>
+      </p:sp>
+    </p:spTree>
+    <p:extLst>
+      <p:ext uri="{BB962C8B-B14F-4D97-AF65-F5344CB8AC3E}">
+        <p14:creationId xmlns:p14="http://schemas.microsoft.com/office/powerpoint/2010/main" val="429670691"/>
+      </p:ext>
+    </p:extLst>
+  </p:cSld>
+  <p:clrMapOvr>
+    <a:masterClrMapping/>
+  </p:clrMapOvr>
+</p:sld>
+</file>
+
+<file path=ppt/slides/slide8.xml><?xml version="1.0" encoding="utf-8"?>
+<p:sld xmlns:a="http://schemas.openxmlformats.org/drawingml/2006/main" xmlns:r="http://schemas.openxmlformats.org/officeDocument/2006/relationships" xmlns:p="http://schemas.openxmlformats.org/presentationml/2006/main">
+  <p:cSld>
+    <p:spTree>
+      <p:nvGrpSpPr>
+        <p:cNvPr id="1" name=""/>
+        <p:cNvGrpSpPr/>
+        <p:nvPr/>
+      </p:nvGrpSpPr>
+      <p:grpSpPr>
+        <a:xfrm>
+          <a:off x="0" y="0"/>
+          <a:ext cx="0" cy="0"/>
+          <a:chOff x="0" y="0"/>
+          <a:chExt cx="0" cy="0"/>
+        </a:xfrm>
+      </p:grpSpPr>
+      <p:sp>
+        <p:nvSpPr>
+          <p:cNvPr id="2" name="Tittel 1">
+            <a:extLst>
+              <a:ext uri="{FF2B5EF4-FFF2-40B4-BE49-F238E27FC236}">
+                <a16:creationId xmlns:a16="http://schemas.microsoft.com/office/drawing/2014/main" id="{18C31D7D-A525-476E-B726-B49BDCDB2078}"/>
+              </a:ext>
+            </a:extLst>
+          </p:cNvPr>
+          <p:cNvSpPr>
+            <a:spLocks noGrp="1"/>
+          </p:cNvSpPr>
+          <p:nvPr>
+            <p:ph type="title"/>
+          </p:nvPr>
+        </p:nvSpPr>
+        <p:spPr>
+          <a:xfrm>
+            <a:off x="646111" y="452718"/>
+            <a:ext cx="9404723" cy="909551"/>
+          </a:xfrm>
+        </p:spPr>
+        <p:txBody>
+          <a:bodyPr/>
+          <a:lstStyle/>
+          <a:p>
+            <a:r>
+              <a:rPr lang="en-GB" sz="1600" dirty="0"/>
+              <a:t>Analysis of network power </a:t>
+            </a:r>
+            <a:br>
+              <a:rPr lang="en-GB" dirty="0"/>
+            </a:br>
+            <a:r>
+              <a:rPr lang="en-GB" dirty="0"/>
+              <a:t>Simulation nr. 3 – Results &amp; Analysis</a:t>
+            </a:r>
+          </a:p>
+        </p:txBody>
+      </p:sp>
+      <p:sp>
+        <p:nvSpPr>
+          <p:cNvPr id="10" name="Plassholder for innhold 2">
+            <a:extLst>
+              <a:ext uri="{FF2B5EF4-FFF2-40B4-BE49-F238E27FC236}">
+                <a16:creationId xmlns:a16="http://schemas.microsoft.com/office/drawing/2014/main" id="{7F861BE9-0CDC-441E-B0B8-80D81F938C07}"/>
+              </a:ext>
+            </a:extLst>
+          </p:cNvPr>
+          <p:cNvSpPr txBox="1">
+            <a:spLocks/>
+          </p:cNvSpPr>
+          <p:nvPr/>
+        </p:nvSpPr>
+        <p:spPr>
+          <a:xfrm>
+            <a:off x="6532774" y="1423447"/>
+            <a:ext cx="4598645" cy="4981835"/>
+          </a:xfrm>
+          <a:prstGeom prst="rect">
+            <a:avLst/>
+          </a:prstGeom>
+        </p:spPr>
+        <p:txBody>
+          <a:bodyPr vert="horz" lIns="91440" tIns="45720" rIns="91440" bIns="45720" rtlCol="0">
+            <a:noAutofit/>
+          </a:bodyPr>
+          <a:lstStyle>
+            <a:lvl1pPr marL="342900" indent="-342900" algn="l" defTabSz="457200" rtl="0" eaLnBrk="1" latinLnBrk="0" hangingPunct="1">
+              <a:spcBef>
+                <a:spcPts val="1000"/>
+              </a:spcBef>
+              <a:spcAft>
+                <a:spcPts val="0"/>
+              </a:spcAft>
+              <a:buClr>
+                <a:schemeClr val="bg2">
+                  <a:lumMod val="40000"/>
+                  <a:lumOff val="60000"/>
+                </a:schemeClr>
+              </a:buClr>
+              <a:buSzPct val="80000"/>
+              <a:buFont typeface="Wingdings 3" charset="2"/>
+              <a:buChar char=""/>
+              <a:defRPr sz="2000" b="0" i="0" kern="1200">
+                <a:solidFill>
+                  <a:schemeClr val="tx1"/>
+                </a:solidFill>
+                <a:latin typeface="+mj-lt"/>
+                <a:ea typeface="+mj-ea"/>
+                <a:cs typeface="+mj-cs"/>
+              </a:defRPr>
+            </a:lvl1pPr>
+            <a:lvl2pPr marL="742950" indent="-285750" algn="l" defTabSz="457200" rtl="0" eaLnBrk="1" latinLnBrk="0" hangingPunct="1">
+              <a:spcBef>
+                <a:spcPts val="1000"/>
+              </a:spcBef>
+              <a:spcAft>
+                <a:spcPts val="0"/>
+              </a:spcAft>
+              <a:buClr>
+                <a:schemeClr val="bg2">
+                  <a:lumMod val="40000"/>
+                  <a:lumOff val="60000"/>
+                </a:schemeClr>
+              </a:buClr>
+              <a:buSzPct val="80000"/>
+              <a:buFont typeface="Wingdings 3" charset="2"/>
+              <a:buChar char=""/>
+              <a:defRPr sz="1800" b="0" i="0" kern="1200">
+                <a:solidFill>
+                  <a:schemeClr val="tx1"/>
+                </a:solidFill>
+                <a:latin typeface="+mj-lt"/>
+                <a:ea typeface="+mj-ea"/>
+                <a:cs typeface="+mj-cs"/>
+              </a:defRPr>
+            </a:lvl2pPr>
+            <a:lvl3pPr marL="1143000" indent="-228600" algn="l" defTabSz="457200" rtl="0" eaLnBrk="1" latinLnBrk="0" hangingPunct="1">
+              <a:spcBef>
+                <a:spcPts val="1000"/>
+              </a:spcBef>
+              <a:spcAft>
+                <a:spcPts val="0"/>
+              </a:spcAft>
+              <a:buClr>
+                <a:schemeClr val="bg2">
+                  <a:lumMod val="40000"/>
+                  <a:lumOff val="60000"/>
+                </a:schemeClr>
+              </a:buClr>
+              <a:buSzPct val="80000"/>
+              <a:buFont typeface="Wingdings 3" charset="2"/>
+              <a:buChar char=""/>
+              <a:defRPr sz="1600" b="0" i="0" kern="1200">
+                <a:solidFill>
+                  <a:schemeClr val="tx1"/>
+                </a:solidFill>
+                <a:latin typeface="+mj-lt"/>
+                <a:ea typeface="+mj-ea"/>
+                <a:cs typeface="+mj-cs"/>
+              </a:defRPr>
+            </a:lvl3pPr>
+            <a:lvl4pPr marL="1600200" indent="-228600" algn="l" defTabSz="457200" rtl="0" eaLnBrk="1" latinLnBrk="0" hangingPunct="1">
+              <a:spcBef>
+                <a:spcPts val="1000"/>
+              </a:spcBef>
+              <a:spcAft>
+                <a:spcPts val="0"/>
+              </a:spcAft>
+              <a:buClr>
+                <a:schemeClr val="bg2">
+                  <a:lumMod val="40000"/>
+                  <a:lumOff val="60000"/>
+                </a:schemeClr>
+              </a:buClr>
+              <a:buSzPct val="80000"/>
+              <a:buFont typeface="Wingdings 3" charset="2"/>
+              <a:buChar char=""/>
+              <a:defRPr sz="1400" b="0" i="0" kern="1200">
+                <a:solidFill>
+                  <a:schemeClr val="tx1"/>
+                </a:solidFill>
+                <a:latin typeface="+mj-lt"/>
+                <a:ea typeface="+mj-ea"/>
+                <a:cs typeface="+mj-cs"/>
+              </a:defRPr>
+            </a:lvl4pPr>
+            <a:lvl5pPr marL="2057400" indent="-228600" algn="l" defTabSz="457200" rtl="0" eaLnBrk="1" latinLnBrk="0" hangingPunct="1">
+              <a:spcBef>
+                <a:spcPts val="1000"/>
+              </a:spcBef>
+              <a:spcAft>
+                <a:spcPts val="0"/>
+              </a:spcAft>
+              <a:buClr>
+                <a:schemeClr val="bg2">
+                  <a:lumMod val="40000"/>
+                  <a:lumOff val="60000"/>
+                </a:schemeClr>
+              </a:buClr>
+              <a:buSzPct val="80000"/>
+              <a:buFont typeface="Wingdings 3" charset="2"/>
+              <a:buChar char=""/>
+              <a:defRPr sz="1400" b="0" i="0" kern="1200">
+                <a:solidFill>
+                  <a:schemeClr val="tx1"/>
+                </a:solidFill>
+                <a:latin typeface="+mj-lt"/>
+                <a:ea typeface="+mj-ea"/>
+                <a:cs typeface="+mj-cs"/>
+              </a:defRPr>
+            </a:lvl5pPr>
+            <a:lvl6pPr marL="2506000" indent="-228600" algn="l" defTabSz="457200" rtl="0" eaLnBrk="1" latinLnBrk="0" hangingPunct="1">
+              <a:spcBef>
+                <a:spcPts val="1000"/>
+              </a:spcBef>
+              <a:spcAft>
+                <a:spcPts val="0"/>
+              </a:spcAft>
+              <a:buClr>
+                <a:schemeClr val="bg2">
+                  <a:lumMod val="40000"/>
+                  <a:lumOff val="60000"/>
+                </a:schemeClr>
+              </a:buClr>
+              <a:buSzPct val="80000"/>
+              <a:buFont typeface="Wingdings 3" charset="2"/>
+              <a:buChar char=""/>
+              <a:defRPr sz="1400" b="0" i="0" kern="1200">
+                <a:solidFill>
+                  <a:schemeClr val="tx1"/>
+                </a:solidFill>
+                <a:latin typeface="+mj-lt"/>
+                <a:ea typeface="+mj-ea"/>
+                <a:cs typeface="+mj-cs"/>
+              </a:defRPr>
+            </a:lvl6pPr>
+            <a:lvl7pPr marL="2971800" indent="-228600" algn="l" defTabSz="457200" rtl="0" eaLnBrk="1" latinLnBrk="0" hangingPunct="1">
+              <a:spcBef>
+                <a:spcPts val="1000"/>
+              </a:spcBef>
+              <a:spcAft>
+                <a:spcPts val="0"/>
+              </a:spcAft>
+              <a:buClr>
+                <a:schemeClr val="bg2">
+                  <a:lumMod val="40000"/>
+                  <a:lumOff val="60000"/>
+                </a:schemeClr>
+              </a:buClr>
+              <a:buSzPct val="80000"/>
+              <a:buFont typeface="Wingdings 3" charset="2"/>
+              <a:buChar char=""/>
+              <a:defRPr sz="1400" b="0" i="0" kern="1200">
+                <a:solidFill>
+                  <a:schemeClr val="tx1"/>
+                </a:solidFill>
+                <a:latin typeface="+mj-lt"/>
+                <a:ea typeface="+mj-ea"/>
+                <a:cs typeface="+mj-cs"/>
+              </a:defRPr>
+            </a:lvl7pPr>
+            <a:lvl8pPr marL="3429000" indent="-228600" algn="l" defTabSz="457200" rtl="0" eaLnBrk="1" latinLnBrk="0" hangingPunct="1">
+              <a:spcBef>
+                <a:spcPts val="1000"/>
+              </a:spcBef>
+              <a:spcAft>
+                <a:spcPts val="0"/>
+              </a:spcAft>
+              <a:buClr>
+                <a:schemeClr val="bg2">
+                  <a:lumMod val="40000"/>
+                  <a:lumOff val="60000"/>
+                </a:schemeClr>
+              </a:buClr>
+              <a:buSzPct val="80000"/>
+              <a:buFont typeface="Wingdings 3" charset="2"/>
+              <a:buChar char=""/>
+              <a:defRPr sz="1400" b="0" i="0" kern="1200">
+                <a:solidFill>
+                  <a:schemeClr val="tx1"/>
+                </a:solidFill>
+                <a:latin typeface="+mj-lt"/>
+                <a:ea typeface="+mj-ea"/>
+                <a:cs typeface="+mj-cs"/>
+              </a:defRPr>
+            </a:lvl8pPr>
+            <a:lvl9pPr marL="3886200" indent="-228600" algn="l" defTabSz="457200" rtl="0" eaLnBrk="1" latinLnBrk="0" hangingPunct="1">
+              <a:spcBef>
+                <a:spcPts val="1000"/>
+              </a:spcBef>
+              <a:spcAft>
+                <a:spcPts val="0"/>
+              </a:spcAft>
+              <a:buClr>
+                <a:schemeClr val="bg2">
+                  <a:lumMod val="40000"/>
+                  <a:lumOff val="60000"/>
+                </a:schemeClr>
+              </a:buClr>
+              <a:buSzPct val="80000"/>
+              <a:buFont typeface="Wingdings 3" charset="2"/>
+              <a:buChar char=""/>
+              <a:defRPr sz="1400" b="0" i="0" kern="1200">
+                <a:solidFill>
+                  <a:schemeClr val="tx1"/>
+                </a:solidFill>
+                <a:latin typeface="+mj-lt"/>
+                <a:ea typeface="+mj-ea"/>
+                <a:cs typeface="+mj-cs"/>
+              </a:defRPr>
+            </a:lvl9pPr>
+          </a:lstStyle>
+          <a:p>
+            <a:r>
+              <a:rPr lang="nb-NO" sz="1400" dirty="0"/>
+              <a:t>Max. </a:t>
+            </a:r>
+            <a:r>
+              <a:rPr lang="nb-NO" sz="1400" dirty="0" err="1"/>
+              <a:t>achieved</a:t>
+            </a:r>
+            <a:r>
+              <a:rPr lang="nb-NO" sz="1400" dirty="0"/>
+              <a:t> </a:t>
+            </a:r>
+            <a:r>
+              <a:rPr lang="nb-NO" sz="1400" dirty="0" err="1"/>
+              <a:t>profit</a:t>
+            </a:r>
+            <a:r>
+              <a:rPr lang="nb-NO" sz="1400" dirty="0"/>
+              <a:t> </a:t>
+            </a:r>
+            <a:r>
+              <a:rPr lang="nb-NO" sz="1400" dirty="0" err="1"/>
+              <a:t>percentage</a:t>
+            </a:r>
+            <a:r>
+              <a:rPr lang="nb-NO" sz="1400" dirty="0"/>
+              <a:t> is 5% for </a:t>
+            </a:r>
+            <a:r>
+              <a:rPr lang="nb-NO" sz="1400" dirty="0" err="1"/>
+              <a:t>the</a:t>
+            </a:r>
+            <a:r>
+              <a:rPr lang="nb-NO" sz="1400" dirty="0"/>
+              <a:t> </a:t>
+            </a:r>
+            <a:r>
+              <a:rPr lang="nb-NO" sz="1400" dirty="0" err="1"/>
+              <a:t>one</a:t>
+            </a:r>
+            <a:r>
+              <a:rPr lang="nb-NO" sz="1400" dirty="0"/>
+              <a:t> </a:t>
+            </a:r>
+            <a:r>
+              <a:rPr lang="nb-NO" sz="1400" dirty="0" err="1"/>
+              <a:t>selfish</a:t>
+            </a:r>
+            <a:r>
+              <a:rPr lang="nb-NO" sz="1400" dirty="0"/>
+              <a:t> miner.</a:t>
+            </a:r>
+          </a:p>
+          <a:p>
+            <a:pPr marL="0" indent="0">
+              <a:buNone/>
+            </a:pPr>
+            <a:r>
+              <a:rPr lang="nb-NO" sz="1400" dirty="0"/>
+              <a:t>	- </a:t>
+            </a:r>
+            <a:r>
+              <a:rPr lang="en-US" sz="1200" dirty="0"/>
+              <a:t>no matter how big of a network power the selfish 	miner has.</a:t>
+            </a:r>
+          </a:p>
+          <a:p>
+            <a:pPr marL="0" indent="0">
+              <a:buNone/>
+            </a:pPr>
+            <a:endParaRPr lang="nb-NO" sz="1400" dirty="0"/>
+          </a:p>
+          <a:p>
+            <a:r>
+              <a:rPr lang="nb-NO" sz="1400" dirty="0"/>
+              <a:t>A </a:t>
+            </a:r>
+            <a:r>
+              <a:rPr lang="en-US" sz="1200" dirty="0"/>
+              <a:t>small increase in profit when the 1 selfish miner owns more than 80% of the total network power.</a:t>
+            </a:r>
+          </a:p>
+          <a:p>
+            <a:pPr marL="0" indent="0">
+              <a:buNone/>
+            </a:pPr>
+            <a:r>
+              <a:rPr lang="en-US" sz="1200" dirty="0"/>
+              <a:t>	- Not realistic, and still under 5% in profit.</a:t>
+            </a:r>
+          </a:p>
+          <a:p>
+            <a:pPr marL="0" indent="0">
+              <a:buNone/>
+            </a:pPr>
+            <a:endParaRPr lang="nb-NO" sz="1400" dirty="0"/>
+          </a:p>
+          <a:p>
+            <a:r>
+              <a:rPr lang="nb-NO" sz="1400" dirty="0" err="1"/>
+              <a:t>Should</a:t>
+            </a:r>
+            <a:r>
+              <a:rPr lang="nb-NO" sz="1400" dirty="0"/>
+              <a:t> </a:t>
+            </a:r>
+            <a:r>
+              <a:rPr lang="en-GB" sz="1400" dirty="0"/>
+              <a:t>the</a:t>
+            </a:r>
+            <a:r>
+              <a:rPr lang="nb-NO" sz="1400" dirty="0"/>
+              <a:t> </a:t>
+            </a:r>
+            <a:r>
+              <a:rPr lang="nb-NO" sz="1400" dirty="0" err="1"/>
+              <a:t>selfish</a:t>
+            </a:r>
+            <a:r>
+              <a:rPr lang="nb-NO" sz="1400" dirty="0"/>
+              <a:t> miner </a:t>
+            </a:r>
+            <a:r>
+              <a:rPr lang="nb-NO" sz="1400" dirty="0" err="1"/>
+              <a:t>switch</a:t>
+            </a:r>
+            <a:r>
+              <a:rPr lang="nb-NO" sz="1400" dirty="0"/>
+              <a:t> to </a:t>
+            </a:r>
+            <a:r>
+              <a:rPr lang="nb-NO" sz="1400" dirty="0" err="1"/>
+              <a:t>honest</a:t>
+            </a:r>
+            <a:r>
+              <a:rPr lang="nb-NO" sz="1400" dirty="0"/>
+              <a:t> </a:t>
+            </a:r>
+            <a:r>
+              <a:rPr lang="nb-NO" sz="1400" dirty="0" err="1"/>
+              <a:t>mining</a:t>
+            </a:r>
+            <a:r>
+              <a:rPr lang="nb-NO" sz="1400" dirty="0"/>
+              <a:t>?</a:t>
+            </a:r>
+          </a:p>
+          <a:p>
+            <a:pPr marL="0" indent="0">
+              <a:buNone/>
+            </a:pPr>
+            <a:r>
+              <a:rPr lang="nb-NO" sz="1400" dirty="0"/>
+              <a:t>	- </a:t>
+            </a:r>
+            <a:r>
+              <a:rPr lang="en-US" sz="1200" dirty="0"/>
+              <a:t>Honest mining is a good strategy for a group of 	honest miners, and miners with low network power</a:t>
+            </a:r>
+            <a:endParaRPr lang="nb-NO" sz="1400" dirty="0"/>
+          </a:p>
+          <a:p>
+            <a:pPr marL="0" indent="0">
+              <a:buNone/>
+            </a:pPr>
+            <a:r>
+              <a:rPr lang="nb-NO" sz="1400" dirty="0"/>
+              <a:t>	- </a:t>
+            </a:r>
+            <a:r>
+              <a:rPr lang="en-US" sz="1200" dirty="0"/>
+              <a:t>Selfish mining is a good strategy for a lonely miner 	with high network power, but not realistic and hard 	to get hold on such large amount of network power.</a:t>
+            </a:r>
+            <a:r>
+              <a:rPr lang="nb-NO" sz="1400" dirty="0"/>
+              <a:t> </a:t>
+            </a:r>
+            <a:endParaRPr lang="en-US" sz="1600" dirty="0"/>
+          </a:p>
+          <a:p>
+            <a:pPr marL="0" indent="0">
+              <a:buFont typeface="Wingdings 3" charset="2"/>
+              <a:buNone/>
+            </a:pPr>
+            <a:r>
+              <a:rPr lang="en-US" sz="1600" dirty="0"/>
+              <a:t> </a:t>
+            </a:r>
+            <a:endParaRPr lang="en-GB" sz="1600" dirty="0"/>
+          </a:p>
+        </p:txBody>
+      </p:sp>
+      <p:pic>
+        <p:nvPicPr>
+          <p:cNvPr id="4" name="Bilde 3">
+            <a:extLst>
+              <a:ext uri="{FF2B5EF4-FFF2-40B4-BE49-F238E27FC236}">
+                <a16:creationId xmlns:a16="http://schemas.microsoft.com/office/drawing/2014/main" id="{37AEF474-4BEE-42A6-B303-59FA73C4803B}"/>
+              </a:ext>
+            </a:extLst>
+          </p:cNvPr>
+          <p:cNvPicPr>
+            <a:picLocks noChangeAspect="1"/>
+          </p:cNvPicPr>
+          <p:nvPr/>
+        </p:nvPicPr>
+        <p:blipFill>
+          <a:blip r:embed="rId2"/>
+          <a:stretch>
+            <a:fillRect/>
+          </a:stretch>
+        </p:blipFill>
+        <p:spPr>
+          <a:xfrm>
+            <a:off x="252577" y="1489435"/>
+            <a:ext cx="6120232" cy="4939741"/>
+          </a:xfrm>
+          <a:prstGeom prst="rect">
+            <a:avLst/>
+          </a:prstGeom>
+        </p:spPr>
+      </p:pic>
+    </p:spTree>
+    <p:extLst>
+      <p:ext uri="{BB962C8B-B14F-4D97-AF65-F5344CB8AC3E}">
+        <p14:creationId xmlns:p14="http://schemas.microsoft.com/office/powerpoint/2010/main" val="3500723437"/>
+      </p:ext>
+    </p:extLst>
+  </p:cSld>
+  <p:clrMapOvr>
+    <a:masterClrMapping/>
+  </p:clrMapOvr>
+</p:sld>
+</file>
+
+<file path=ppt/slides/slide9.xml><?xml version="1.0" encoding="utf-8"?>
+<p:sld xmlns:a="http://schemas.openxmlformats.org/drawingml/2006/main" xmlns:r="http://schemas.openxmlformats.org/officeDocument/2006/relationships" xmlns:p="http://schemas.openxmlformats.org/presentationml/2006/main">
+  <p:cSld>
+    <p:spTree>
+      <p:nvGrpSpPr>
+        <p:cNvPr id="1" name=""/>
+        <p:cNvGrpSpPr/>
+        <p:nvPr/>
+      </p:nvGrpSpPr>
+      <p:grpSpPr>
+        <a:xfrm>
+          <a:off x="0" y="0"/>
+          <a:ext cx="0" cy="0"/>
+          <a:chOff x="0" y="0"/>
+          <a:chExt cx="0" cy="0"/>
+        </a:xfrm>
+      </p:grpSpPr>
+      <p:sp>
+        <p:nvSpPr>
+          <p:cNvPr id="2" name="Tittel 1">
+            <a:extLst>
+              <a:ext uri="{FF2B5EF4-FFF2-40B4-BE49-F238E27FC236}">
+                <a16:creationId xmlns:a16="http://schemas.microsoft.com/office/drawing/2014/main" id="{18C31D7D-A525-476E-B726-B49BDCDB2078}"/>
+              </a:ext>
+            </a:extLst>
+          </p:cNvPr>
+          <p:cNvSpPr>
+            <a:spLocks noGrp="1"/>
+          </p:cNvSpPr>
+          <p:nvPr>
+            <p:ph type="title"/>
+          </p:nvPr>
+        </p:nvSpPr>
+        <p:spPr>
+          <a:xfrm>
+            <a:off x="646111" y="452718"/>
+            <a:ext cx="9404723" cy="909551"/>
+          </a:xfrm>
+        </p:spPr>
+        <p:txBody>
+          <a:bodyPr/>
+          <a:lstStyle/>
+          <a:p>
+            <a:r>
+              <a:rPr lang="en-GB" sz="1600" dirty="0"/>
+              <a:t>Analysis of network power </a:t>
+            </a:r>
+            <a:br>
+              <a:rPr lang="en-GB" dirty="0"/>
+            </a:br>
+            <a:r>
+              <a:rPr lang="en-GB" dirty="0"/>
+              <a:t>Simulation nr. 4 - Setup</a:t>
+            </a:r>
+          </a:p>
+        </p:txBody>
+      </p:sp>
+      <p:sp>
+        <p:nvSpPr>
+          <p:cNvPr id="3" name="Plassholder for innhold 2">
+            <a:extLst>
+              <a:ext uri="{FF2B5EF4-FFF2-40B4-BE49-F238E27FC236}">
+                <a16:creationId xmlns:a16="http://schemas.microsoft.com/office/drawing/2014/main" id="{A3D68D6D-CD3E-4CB1-BBA5-1AA2A6400C9D}"/>
+              </a:ext>
+            </a:extLst>
+          </p:cNvPr>
+          <p:cNvSpPr>
+            <a:spLocks noGrp="1"/>
+          </p:cNvSpPr>
+          <p:nvPr>
+            <p:ph idx="1"/>
+          </p:nvPr>
+        </p:nvSpPr>
+        <p:spPr>
+          <a:xfrm>
+            <a:off x="727788" y="1408922"/>
+            <a:ext cx="10403632" cy="5449078"/>
+          </a:xfrm>
+        </p:spPr>
+        <p:txBody>
+          <a:bodyPr>
+            <a:noAutofit/>
+          </a:bodyPr>
+          <a:lstStyle/>
+          <a:p>
+            <a:r>
+              <a:rPr lang="en-US" sz="1400" dirty="0"/>
+              <a:t>Studying the effect of an increasing number of selfish miners where all individual honest and selfish miners have equal network power</a:t>
+            </a:r>
+            <a:r>
+              <a:rPr lang="en-US" sz="1600" dirty="0"/>
+              <a:t>.</a:t>
+            </a:r>
+          </a:p>
+          <a:p>
+            <a:endParaRPr lang="en-US" sz="1600" dirty="0"/>
+          </a:p>
+          <a:p>
+            <a:r>
+              <a:rPr lang="en-US" sz="1600" dirty="0"/>
+              <a:t>Having:</a:t>
+            </a:r>
+          </a:p>
+          <a:p>
+            <a:pPr marL="0" indent="0">
+              <a:buNone/>
+            </a:pPr>
+            <a:r>
+              <a:rPr lang="en-US" sz="1600" dirty="0"/>
+              <a:t>	- 100 in total network power and 100 miners.</a:t>
+            </a:r>
+          </a:p>
+          <a:p>
+            <a:pPr marL="0" indent="0">
+              <a:buNone/>
+            </a:pPr>
+            <a:r>
+              <a:rPr lang="en-US" sz="1600" dirty="0"/>
+              <a:t>	- Every miner always has an equal network power of 1.</a:t>
+            </a:r>
+          </a:p>
+          <a:p>
+            <a:pPr marL="0" indent="0">
+              <a:buNone/>
+            </a:pPr>
+            <a:r>
+              <a:rPr lang="en-US" sz="1600" dirty="0"/>
+              <a:t>	- Network power is weighted random.</a:t>
+            </a:r>
+          </a:p>
+          <a:p>
+            <a:pPr marL="0" indent="0">
+              <a:buNone/>
+            </a:pPr>
+            <a:r>
+              <a:rPr lang="en-US" sz="1600" dirty="0"/>
+              <a:t>	- Mining power is equal for all miners to isolate its effect on mining. </a:t>
+            </a:r>
+          </a:p>
+          <a:p>
+            <a:pPr marL="0" indent="0">
+              <a:buNone/>
+            </a:pPr>
+            <a:endParaRPr lang="en-US" sz="1600" dirty="0"/>
+          </a:p>
+          <a:p>
+            <a:r>
+              <a:rPr lang="en-US" sz="1600" dirty="0"/>
+              <a:t>We start the selfish network power at 0% (0 selfish miners) </a:t>
+            </a:r>
+          </a:p>
+          <a:p>
+            <a:pPr marL="0" indent="0">
+              <a:buNone/>
+            </a:pPr>
+            <a:r>
+              <a:rPr lang="en-US" sz="1600" dirty="0"/>
+              <a:t>	And the honest network power at 100% (100 honest miners). </a:t>
+            </a:r>
+          </a:p>
+          <a:p>
+            <a:endParaRPr lang="en-US" sz="1600" dirty="0"/>
+          </a:p>
+          <a:p>
+            <a:r>
+              <a:rPr lang="en-US" sz="1600" dirty="0"/>
+              <a:t>We run the simulation for 100 steps, and at each step:</a:t>
+            </a:r>
+          </a:p>
+          <a:p>
+            <a:pPr marL="0" indent="0">
+              <a:buNone/>
+            </a:pPr>
+            <a:r>
+              <a:rPr lang="en-US" sz="1600" dirty="0"/>
+              <a:t>	- Increasing the selfish network power by increasing the number of selfish miners by 1.</a:t>
+            </a:r>
+          </a:p>
+          <a:p>
+            <a:pPr marL="0" indent="0">
+              <a:buNone/>
+            </a:pPr>
+            <a:r>
+              <a:rPr lang="en-US" sz="1600" dirty="0"/>
+              <a:t>	- Decreasing the honest network power by decreasing the number of honest miners by 1.</a:t>
+            </a:r>
+          </a:p>
+          <a:p>
+            <a:pPr marL="0" indent="0">
+              <a:buNone/>
+            </a:pPr>
+            <a:endParaRPr lang="en-US" sz="1600" dirty="0"/>
+          </a:p>
+          <a:p>
+            <a:pPr marL="0" indent="0">
+              <a:buNone/>
+            </a:pPr>
+            <a:r>
+              <a:rPr lang="en-US" sz="1600" dirty="0"/>
+              <a:t> </a:t>
+            </a:r>
+            <a:endParaRPr lang="en-GB" sz="1600" dirty="0"/>
+          </a:p>
+        </p:txBody>
+      </p:sp>
+    </p:spTree>
+    <p:extLst>
+      <p:ext uri="{BB962C8B-B14F-4D97-AF65-F5344CB8AC3E}">
+        <p14:creationId xmlns:p14="http://schemas.microsoft.com/office/powerpoint/2010/main" val="2437972767"/>
       </p:ext>
     </p:extLst>
   </p:cSld>

</xml_diff>